<commit_message>
bofa pptx template first draft
</commit_message>
<xml_diff>
--- a/precious/VCU SteerCo 2021-5-13v1.pptx
+++ b/precious/VCU SteerCo 2021-5-13v1.pptx
@@ -21,7 +21,7 @@
     <p:sldId id="644" r:id="rId12"/>
     <p:sldId id="647" r:id="rId13"/>
   </p:sldIdLst>
-  <p:sldSz cx="9144000" cy="6858000" type="screen4x3"/>
+  <p:sldSz cx="10063163" cy="7546975"/>
   <p:notesSz cx="6985000" cy="9283700"/>
   <p:custDataLst>
     <p:tags r:id="rId16"/>
@@ -30,14 +30,14 @@
     <a:defPPr>
       <a:defRPr lang="en-US"/>
     </a:defPPr>
-    <a:lvl1pPr algn="l" defTabSz="429836" rtl="0" fontAlgn="base">
+    <a:lvl1pPr algn="l" defTabSz="473075" rtl="0" fontAlgn="base">
       <a:spcBef>
         <a:spcPct val="0"/>
       </a:spcBef>
       <a:spcAft>
         <a:spcPct val="0"/>
       </a:spcAft>
-      <a:defRPr sz="2090" kern="1200">
+      <a:defRPr sz="2300" kern="1200">
         <a:solidFill>
           <a:schemeClr val="tx1"/>
         </a:solidFill>
@@ -46,14 +46,14 @@
         <a:cs typeface="+mn-cs"/>
       </a:defRPr>
     </a:lvl1pPr>
-    <a:lvl2pPr marL="429836" indent="-28848" algn="l" defTabSz="429836" rtl="0" fontAlgn="base">
+    <a:lvl2pPr marL="473075" indent="-31750" algn="l" defTabSz="473075" rtl="0" fontAlgn="base">
       <a:spcBef>
         <a:spcPct val="0"/>
       </a:spcBef>
       <a:spcAft>
         <a:spcPct val="0"/>
       </a:spcAft>
-      <a:defRPr sz="2090" kern="1200">
+      <a:defRPr sz="2300" kern="1200">
         <a:solidFill>
           <a:schemeClr val="tx1"/>
         </a:solidFill>
@@ -62,14 +62,14 @@
         <a:cs typeface="+mn-cs"/>
       </a:defRPr>
     </a:lvl2pPr>
-    <a:lvl3pPr marL="859672" indent="-57696" algn="l" defTabSz="429836" rtl="0" fontAlgn="base">
+    <a:lvl3pPr marL="946150" indent="-63500" algn="l" defTabSz="473075" rtl="0" fontAlgn="base">
       <a:spcBef>
         <a:spcPct val="0"/>
       </a:spcBef>
       <a:spcAft>
         <a:spcPct val="0"/>
       </a:spcAft>
-      <a:defRPr sz="2090" kern="1200">
+      <a:defRPr sz="2300" kern="1200">
         <a:solidFill>
           <a:schemeClr val="tx1"/>
         </a:solidFill>
@@ -78,14 +78,14 @@
         <a:cs typeface="+mn-cs"/>
       </a:defRPr>
     </a:lvl3pPr>
-    <a:lvl4pPr marL="1289508" indent="-86544" algn="l" defTabSz="429836" rtl="0" fontAlgn="base">
+    <a:lvl4pPr marL="1419225" indent="-95250" algn="l" defTabSz="473075" rtl="0" fontAlgn="base">
       <a:spcBef>
         <a:spcPct val="0"/>
       </a:spcBef>
       <a:spcAft>
         <a:spcPct val="0"/>
       </a:spcAft>
-      <a:defRPr sz="2090" kern="1200">
+      <a:defRPr sz="2300" kern="1200">
         <a:solidFill>
           <a:schemeClr val="tx1"/>
         </a:solidFill>
@@ -94,14 +94,14 @@
         <a:cs typeface="+mn-cs"/>
       </a:defRPr>
     </a:lvl4pPr>
-    <a:lvl5pPr marL="1720787" indent="-116835" algn="l" defTabSz="429836" rtl="0" fontAlgn="base">
+    <a:lvl5pPr marL="1893888" indent="-128588" algn="l" defTabSz="473075" rtl="0" fontAlgn="base">
       <a:spcBef>
         <a:spcPct val="0"/>
       </a:spcBef>
       <a:spcAft>
         <a:spcPct val="0"/>
       </a:spcAft>
-      <a:defRPr sz="2090" kern="1200">
+      <a:defRPr sz="2300" kern="1200">
         <a:solidFill>
           <a:schemeClr val="tx1"/>
         </a:solidFill>
@@ -110,8 +110,8 @@
         <a:cs typeface="+mn-cs"/>
       </a:defRPr>
     </a:lvl5pPr>
-    <a:lvl6pPr marL="2077060" algn="l" defTabSz="830824" rtl="0" eaLnBrk="1" latinLnBrk="0" hangingPunct="1">
-      <a:defRPr sz="2090" kern="1200">
+    <a:lvl6pPr marL="2286000" algn="l" defTabSz="914400" rtl="0" eaLnBrk="1" latinLnBrk="0" hangingPunct="1">
+      <a:defRPr sz="2300" kern="1200">
         <a:solidFill>
           <a:schemeClr val="tx1"/>
         </a:solidFill>
@@ -120,8 +120,8 @@
         <a:cs typeface="+mn-cs"/>
       </a:defRPr>
     </a:lvl6pPr>
-    <a:lvl7pPr marL="2492472" algn="l" defTabSz="830824" rtl="0" eaLnBrk="1" latinLnBrk="0" hangingPunct="1">
-      <a:defRPr sz="2090" kern="1200">
+    <a:lvl7pPr marL="2743200" algn="l" defTabSz="914400" rtl="0" eaLnBrk="1" latinLnBrk="0" hangingPunct="1">
+      <a:defRPr sz="2300" kern="1200">
         <a:solidFill>
           <a:schemeClr val="tx1"/>
         </a:solidFill>
@@ -130,8 +130,8 @@
         <a:cs typeface="+mn-cs"/>
       </a:defRPr>
     </a:lvl7pPr>
-    <a:lvl8pPr marL="2907883" algn="l" defTabSz="830824" rtl="0" eaLnBrk="1" latinLnBrk="0" hangingPunct="1">
-      <a:defRPr sz="2090" kern="1200">
+    <a:lvl8pPr marL="3200400" algn="l" defTabSz="914400" rtl="0" eaLnBrk="1" latinLnBrk="0" hangingPunct="1">
+      <a:defRPr sz="2300" kern="1200">
         <a:solidFill>
           <a:schemeClr val="tx1"/>
         </a:solidFill>
@@ -140,8 +140,8 @@
         <a:cs typeface="+mn-cs"/>
       </a:defRPr>
     </a:lvl8pPr>
-    <a:lvl9pPr marL="3323295" algn="l" defTabSz="830824" rtl="0" eaLnBrk="1" latinLnBrk="0" hangingPunct="1">
-      <a:defRPr sz="2090" kern="1200">
+    <a:lvl9pPr marL="3657600" algn="l" defTabSz="914400" rtl="0" eaLnBrk="1" latinLnBrk="0" hangingPunct="1">
+      <a:defRPr sz="2300" kern="1200">
         <a:solidFill>
           <a:schemeClr val="tx1"/>
         </a:solidFill>
@@ -154,37 +154,37 @@
   <p:extLst>
     <p:ext uri="{EFAFB233-063F-42B5-8137-9DF3F51BA10A}">
       <p15:sldGuideLst xmlns:p15="http://schemas.microsoft.com/office/powerpoint/2012/main">
-        <p15:guide id="1" orient="horz" pos="3970" userDrawn="1">
+        <p15:guide id="1" orient="horz" pos="4369" userDrawn="1">
           <p15:clr>
             <a:srgbClr val="A4A3A4"/>
           </p15:clr>
         </p15:guide>
-        <p15:guide id="2" orient="horz" pos="206" userDrawn="1">
+        <p15:guide id="2" orient="horz" pos="227" userDrawn="1">
           <p15:clr>
             <a:srgbClr val="A4A3A4"/>
           </p15:clr>
         </p15:guide>
-        <p15:guide id="4" orient="horz" pos="3787" userDrawn="1">
+        <p15:guide id="4" orient="horz" pos="4168" userDrawn="1">
           <p15:clr>
             <a:srgbClr val="A4A3A4"/>
           </p15:clr>
         </p15:guide>
-        <p15:guide id="5" orient="horz" pos="350" userDrawn="1">
+        <p15:guide id="5" orient="horz" pos="385" userDrawn="1">
           <p15:clr>
             <a:srgbClr val="A4A3A4"/>
           </p15:clr>
         </p15:guide>
-        <p15:guide id="6" orient="horz" pos="3708" userDrawn="1">
+        <p15:guide id="6" orient="horz" pos="4081" userDrawn="1">
           <p15:clr>
             <a:srgbClr val="A4A3A4"/>
           </p15:clr>
         </p15:guide>
-        <p15:guide id="7" pos="220" userDrawn="1">
+        <p15:guide id="7" pos="242" userDrawn="1">
           <p15:clr>
             <a:srgbClr val="A4A3A4"/>
           </p15:clr>
         </p15:guide>
-        <p15:guide id="8" pos="5555" userDrawn="1">
+        <p15:guide id="8" pos="6113" userDrawn="1">
           <p15:clr>
             <a:srgbClr val="A4A3A4"/>
           </p15:clr>
@@ -324,7 +324,7 @@
               <a:pPr>
                 <a:defRPr/>
               </a:pPr>
-              <a:t>6/27/23</a:t>
+              <a:t>5/12/2021</a:t>
             </a:fld>
             <a:endParaRPr lang="en-US" dirty="0"/>
           </a:p>
@@ -534,7 +534,7 @@
               <a:pPr>
                 <a:defRPr/>
               </a:pPr>
-              <a:t>6/27/23</a:t>
+              <a:t>5/12/2021</a:t>
             </a:fld>
             <a:endParaRPr lang="en-US" dirty="0"/>
           </a:p>
@@ -736,14 +736,14 @@
   <p:clrMap bg1="lt1" tx1="dk1" bg2="lt2" tx2="dk2" accent1="accent1" accent2="accent2" accent3="accent3" accent4="accent4" accent5="accent5" accent6="accent6" hlink="hlink" folHlink="folHlink"/>
   <p:hf hdr="0" ftr="0" dt="0"/>
   <p:notesStyle>
-    <a:lvl1pPr algn="l" defTabSz="429836" rtl="0" eaLnBrk="0" fontAlgn="base" hangingPunct="0">
+    <a:lvl1pPr algn="l" defTabSz="473075" rtl="0" eaLnBrk="0" fontAlgn="base" hangingPunct="0">
       <a:spcBef>
         <a:spcPct val="30000"/>
       </a:spcBef>
       <a:spcAft>
         <a:spcPct val="0"/>
       </a:spcAft>
-      <a:defRPr sz="1181" kern="1200">
+      <a:defRPr sz="1300" kern="1200">
         <a:solidFill>
           <a:schemeClr val="tx1"/>
         </a:solidFill>
@@ -752,14 +752,14 @@
         <a:cs typeface="ＭＳ Ｐゴシック" charset="0"/>
       </a:defRPr>
     </a:lvl1pPr>
-    <a:lvl2pPr marL="429836" algn="l" defTabSz="429836" rtl="0" eaLnBrk="0" fontAlgn="base" hangingPunct="0">
+    <a:lvl2pPr marL="473075" algn="l" defTabSz="473075" rtl="0" eaLnBrk="0" fontAlgn="base" hangingPunct="0">
       <a:spcBef>
         <a:spcPct val="30000"/>
       </a:spcBef>
       <a:spcAft>
         <a:spcPct val="0"/>
       </a:spcAft>
-      <a:defRPr sz="1181" kern="1200">
+      <a:defRPr sz="1300" kern="1200">
         <a:solidFill>
           <a:schemeClr val="tx1"/>
         </a:solidFill>
@@ -768,14 +768,14 @@
         <a:cs typeface="+mn-cs"/>
       </a:defRPr>
     </a:lvl2pPr>
-    <a:lvl3pPr marL="859672" algn="l" defTabSz="429836" rtl="0" eaLnBrk="0" fontAlgn="base" hangingPunct="0">
+    <a:lvl3pPr marL="946150" algn="l" defTabSz="473075" rtl="0" eaLnBrk="0" fontAlgn="base" hangingPunct="0">
       <a:spcBef>
         <a:spcPct val="30000"/>
       </a:spcBef>
       <a:spcAft>
         <a:spcPct val="0"/>
       </a:spcAft>
-      <a:defRPr sz="1181" kern="1200">
+      <a:defRPr sz="1300" kern="1200">
         <a:solidFill>
           <a:schemeClr val="tx1"/>
         </a:solidFill>
@@ -784,14 +784,14 @@
         <a:cs typeface="+mn-cs"/>
       </a:defRPr>
     </a:lvl3pPr>
-    <a:lvl4pPr marL="1289508" algn="l" defTabSz="429836" rtl="0" eaLnBrk="0" fontAlgn="base" hangingPunct="0">
+    <a:lvl4pPr marL="1419225" algn="l" defTabSz="473075" rtl="0" eaLnBrk="0" fontAlgn="base" hangingPunct="0">
       <a:spcBef>
         <a:spcPct val="30000"/>
       </a:spcBef>
       <a:spcAft>
         <a:spcPct val="0"/>
       </a:spcAft>
-      <a:defRPr sz="1181" kern="1200">
+      <a:defRPr sz="1300" kern="1200">
         <a:solidFill>
           <a:schemeClr val="tx1"/>
         </a:solidFill>
@@ -800,14 +800,14 @@
         <a:cs typeface="+mn-cs"/>
       </a:defRPr>
     </a:lvl4pPr>
-    <a:lvl5pPr marL="1720787" algn="l" defTabSz="429836" rtl="0" eaLnBrk="0" fontAlgn="base" hangingPunct="0">
+    <a:lvl5pPr marL="1893888" algn="l" defTabSz="473075" rtl="0" eaLnBrk="0" fontAlgn="base" hangingPunct="0">
       <a:spcBef>
         <a:spcPct val="30000"/>
       </a:spcBef>
       <a:spcAft>
         <a:spcPct val="0"/>
       </a:spcAft>
-      <a:defRPr sz="1181" kern="1200">
+      <a:defRPr sz="1300" kern="1200">
         <a:solidFill>
           <a:schemeClr val="tx1"/>
         </a:solidFill>
@@ -816,8 +816,8 @@
         <a:cs typeface="+mn-cs"/>
       </a:defRPr>
     </a:lvl5pPr>
-    <a:lvl6pPr marL="2151793" algn="l" defTabSz="430358" rtl="0" eaLnBrk="1" latinLnBrk="0" hangingPunct="1">
-      <a:defRPr sz="1181" kern="1200">
+    <a:lvl6pPr marL="2368251" algn="l" defTabSz="473650" rtl="0" eaLnBrk="1" latinLnBrk="0" hangingPunct="1">
+      <a:defRPr sz="1300" kern="1200">
         <a:solidFill>
           <a:schemeClr val="tx1"/>
         </a:solidFill>
@@ -826,8 +826,8 @@
         <a:cs typeface="+mn-cs"/>
       </a:defRPr>
     </a:lvl6pPr>
-    <a:lvl7pPr marL="2582152" algn="l" defTabSz="430358" rtl="0" eaLnBrk="1" latinLnBrk="0" hangingPunct="1">
-      <a:defRPr sz="1181" kern="1200">
+    <a:lvl7pPr marL="2841902" algn="l" defTabSz="473650" rtl="0" eaLnBrk="1" latinLnBrk="0" hangingPunct="1">
+      <a:defRPr sz="1300" kern="1200">
         <a:solidFill>
           <a:schemeClr val="tx1"/>
         </a:solidFill>
@@ -836,8 +836,8 @@
         <a:cs typeface="+mn-cs"/>
       </a:defRPr>
     </a:lvl7pPr>
-    <a:lvl8pPr marL="3012511" algn="l" defTabSz="430358" rtl="0" eaLnBrk="1" latinLnBrk="0" hangingPunct="1">
-      <a:defRPr sz="1181" kern="1200">
+    <a:lvl8pPr marL="3315552" algn="l" defTabSz="473650" rtl="0" eaLnBrk="1" latinLnBrk="0" hangingPunct="1">
+      <a:defRPr sz="1300" kern="1200">
         <a:solidFill>
           <a:schemeClr val="tx1"/>
         </a:solidFill>
@@ -846,8 +846,8 @@
         <a:cs typeface="+mn-cs"/>
       </a:defRPr>
     </a:lvl8pPr>
-    <a:lvl9pPr marL="3442869" algn="l" defTabSz="430358" rtl="0" eaLnBrk="1" latinLnBrk="0" hangingPunct="1">
-      <a:defRPr sz="1181" kern="1200">
+    <a:lvl9pPr marL="3789202" algn="l" defTabSz="473650" rtl="0" eaLnBrk="1" latinLnBrk="0" hangingPunct="1">
+      <a:defRPr sz="1300" kern="1200">
         <a:solidFill>
           <a:schemeClr val="tx1"/>
         </a:solidFill>
@@ -1609,8 +1609,8 @@
         </p:nvSpPr>
         <p:spPr bwMode="auto">
           <a:xfrm>
-            <a:off x="326108" y="6369853"/>
-            <a:ext cx="2454158" cy="163568"/>
+            <a:off x="358889" y="7009788"/>
+            <a:ext cx="2700852" cy="180000"/>
           </a:xfrm>
           <a:prstGeom prst="rect">
             <a:avLst/>
@@ -1670,8 +1670,8 @@
         </p:nvCxnSpPr>
         <p:spPr>
           <a:xfrm>
-            <a:off x="326108" y="916037"/>
-            <a:ext cx="8490341" cy="1442"/>
+            <a:off x="358888" y="1008064"/>
+            <a:ext cx="9343798" cy="1587"/>
           </a:xfrm>
           <a:prstGeom prst="line">
             <a:avLst/>
@@ -1712,8 +1712,8 @@
         </p:nvSpPr>
         <p:spPr>
           <a:xfrm>
-            <a:off x="326107" y="6531978"/>
-            <a:ext cx="369396" cy="163011"/>
+            <a:off x="358888" y="7188200"/>
+            <a:ext cx="406528" cy="179388"/>
           </a:xfrm>
           <a:prstGeom prst="rect">
             <a:avLst/>
@@ -1761,8 +1761,8 @@
         </p:nvSpPr>
         <p:spPr>
           <a:xfrm>
-            <a:off x="276489" y="6355257"/>
-            <a:ext cx="1094880" cy="184666"/>
+            <a:off x="358889" y="7002464"/>
+            <a:ext cx="1095721" cy="185737"/>
           </a:xfrm>
           <a:prstGeom prst="rect">
             <a:avLst/>
@@ -1827,8 +1827,8 @@
         </p:nvSpPr>
         <p:spPr>
           <a:xfrm>
-            <a:off x="1419005" y="6355257"/>
-            <a:ext cx="570249" cy="184666"/>
+            <a:off x="1589590" y="7002464"/>
+            <a:ext cx="571680" cy="185737"/>
           </a:xfrm>
           <a:prstGeom prst="rect">
             <a:avLst/>
@@ -1893,8 +1893,8 @@
         </p:nvSpPr>
         <p:spPr bwMode="auto">
           <a:xfrm>
-            <a:off x="2927914" y="6270270"/>
-            <a:ext cx="5889979" cy="261708"/>
+            <a:off x="3222230" y="6900200"/>
+            <a:ext cx="6482045" cy="288000"/>
           </a:xfrm>
           <a:prstGeom prst="rect">
             <a:avLst/>
@@ -1954,8 +1954,8 @@
         </p:nvSpPr>
         <p:spPr>
           <a:xfrm>
-            <a:off x="7999840" y="6270270"/>
-            <a:ext cx="818053" cy="261708"/>
+            <a:off x="8803991" y="6900200"/>
+            <a:ext cx="900284" cy="288000"/>
           </a:xfrm>
           <a:prstGeom prst="rect">
             <a:avLst/>
@@ -2010,8 +2010,8 @@
         </p:nvSpPr>
         <p:spPr>
           <a:xfrm>
-            <a:off x="7836230" y="6017297"/>
-            <a:ext cx="163611" cy="261708"/>
+            <a:off x="8623934" y="6621812"/>
+            <a:ext cx="180057" cy="288000"/>
           </a:xfrm>
           <a:prstGeom prst="rect">
             <a:avLst/>
@@ -2052,8 +2052,8 @@
         </p:nvCxnSpPr>
         <p:spPr bwMode="auto">
           <a:xfrm rot="16200000" flipH="1">
-            <a:off x="5742271" y="6401426"/>
-            <a:ext cx="261106" cy="0"/>
+            <a:off x="6319496" y="7044532"/>
+            <a:ext cx="287337" cy="0"/>
           </a:xfrm>
           <a:prstGeom prst="line">
             <a:avLst/>
@@ -2081,8 +2081,8 @@
         </p:nvSpPr>
         <p:spPr>
           <a:xfrm>
-            <a:off x="1337749" y="6218430"/>
-            <a:ext cx="98166" cy="163568"/>
+            <a:off x="1472221" y="6843152"/>
+            <a:ext cx="108034" cy="180000"/>
           </a:xfrm>
           <a:prstGeom prst="rect">
             <a:avLst/>
@@ -2125,8 +2125,8 @@
         </p:nvSpPr>
         <p:spPr bwMode="auto">
           <a:xfrm>
-            <a:off x="326107" y="6016981"/>
-            <a:ext cx="2454465" cy="164454"/>
+            <a:off x="358888" y="6621464"/>
+            <a:ext cx="2701190" cy="180975"/>
           </a:xfrm>
           <a:prstGeom prst="rect">
             <a:avLst/>
@@ -2179,8 +2179,8 @@
         </p:nvSpPr>
         <p:spPr bwMode="auto">
           <a:xfrm>
-            <a:off x="4965809" y="324060"/>
-            <a:ext cx="3852085" cy="330210"/>
+            <a:off x="5464976" y="356616"/>
+            <a:ext cx="4239300" cy="363384"/>
           </a:xfrm>
           <a:prstGeom prst="rect">
             <a:avLst/>
@@ -2243,8 +2243,8 @@
         </p:nvSpPr>
         <p:spPr>
           <a:xfrm>
-            <a:off x="326107" y="327135"/>
-            <a:ext cx="6855679" cy="327135"/>
+            <a:off x="358888" y="360000"/>
+            <a:ext cx="7544818" cy="360000"/>
           </a:xfrm>
           <a:prstGeom prst="rect">
             <a:avLst/>
@@ -2314,8 +2314,8 @@
         </p:nvSpPr>
         <p:spPr>
           <a:xfrm>
-            <a:off x="326108" y="1243113"/>
-            <a:ext cx="8490670" cy="4786849"/>
+            <a:off x="358889" y="1368000"/>
+            <a:ext cx="9344160" cy="5267750"/>
           </a:xfrm>
           <a:prstGeom prst="rect">
             <a:avLst/>
@@ -2476,8 +2476,8 @@
         </p:blipFill>
         <p:spPr>
           <a:xfrm>
-            <a:off x="7591094" y="324061"/>
-            <a:ext cx="1226800" cy="316789"/>
+            <a:off x="8354157" y="356616"/>
+            <a:ext cx="1350119" cy="348615"/>
           </a:xfrm>
           <a:prstGeom prst="rect">
             <a:avLst/>
@@ -2521,8 +2521,8 @@
         </p:nvSpPr>
         <p:spPr bwMode="auto">
           <a:xfrm>
-            <a:off x="326108" y="6369853"/>
-            <a:ext cx="2454158" cy="163568"/>
+            <a:off x="358889" y="7009788"/>
+            <a:ext cx="2700852" cy="180000"/>
           </a:xfrm>
           <a:prstGeom prst="rect">
             <a:avLst/>
@@ -2582,8 +2582,8 @@
         </p:nvCxnSpPr>
         <p:spPr>
           <a:xfrm>
-            <a:off x="326108" y="916037"/>
-            <a:ext cx="8490341" cy="1442"/>
+            <a:off x="358888" y="1008064"/>
+            <a:ext cx="9343798" cy="1587"/>
           </a:xfrm>
           <a:prstGeom prst="line">
             <a:avLst/>
@@ -2624,8 +2624,8 @@
         </p:nvSpPr>
         <p:spPr>
           <a:xfrm>
-            <a:off x="326107" y="6531978"/>
-            <a:ext cx="369396" cy="163011"/>
+            <a:off x="358888" y="7188200"/>
+            <a:ext cx="406528" cy="179388"/>
           </a:xfrm>
           <a:prstGeom prst="rect">
             <a:avLst/>
@@ -2673,8 +2673,8 @@
         </p:nvSpPr>
         <p:spPr bwMode="auto">
           <a:xfrm>
-            <a:off x="2927914" y="6270270"/>
-            <a:ext cx="5889979" cy="261708"/>
+            <a:off x="3222230" y="6900200"/>
+            <a:ext cx="6482045" cy="288000"/>
           </a:xfrm>
           <a:prstGeom prst="rect">
             <a:avLst/>
@@ -2734,8 +2734,8 @@
         </p:nvSpPr>
         <p:spPr>
           <a:xfrm>
-            <a:off x="7999840" y="6270270"/>
-            <a:ext cx="818053" cy="261708"/>
+            <a:off x="8803991" y="6900200"/>
+            <a:ext cx="900284" cy="288000"/>
           </a:xfrm>
           <a:prstGeom prst="rect">
             <a:avLst/>
@@ -2790,8 +2790,8 @@
         </p:nvSpPr>
         <p:spPr>
           <a:xfrm>
-            <a:off x="7836230" y="6017297"/>
-            <a:ext cx="163611" cy="261708"/>
+            <a:off x="8623934" y="6621812"/>
+            <a:ext cx="180057" cy="288000"/>
           </a:xfrm>
           <a:prstGeom prst="rect">
             <a:avLst/>
@@ -2832,8 +2832,8 @@
         </p:nvCxnSpPr>
         <p:spPr bwMode="auto">
           <a:xfrm rot="16200000" flipH="1">
-            <a:off x="5742271" y="6401426"/>
-            <a:ext cx="261106" cy="0"/>
+            <a:off x="6319496" y="7044532"/>
+            <a:ext cx="287337" cy="0"/>
           </a:xfrm>
           <a:prstGeom prst="line">
             <a:avLst/>
@@ -2861,8 +2861,8 @@
         </p:nvSpPr>
         <p:spPr>
           <a:xfrm>
-            <a:off x="1337749" y="6218430"/>
-            <a:ext cx="98166" cy="163568"/>
+            <a:off x="1472221" y="6843152"/>
+            <a:ext cx="108034" cy="180000"/>
           </a:xfrm>
           <a:prstGeom prst="rect">
             <a:avLst/>
@@ -2905,8 +2905,8 @@
         </p:nvSpPr>
         <p:spPr bwMode="auto">
           <a:xfrm>
-            <a:off x="326107" y="6016981"/>
-            <a:ext cx="2454465" cy="164454"/>
+            <a:off x="358888" y="6621464"/>
+            <a:ext cx="2701190" cy="180975"/>
           </a:xfrm>
           <a:prstGeom prst="rect">
             <a:avLst/>
@@ -2959,8 +2959,8 @@
         </p:nvSpPr>
         <p:spPr bwMode="auto">
           <a:xfrm>
-            <a:off x="4965809" y="324060"/>
-            <a:ext cx="3852085" cy="330210"/>
+            <a:off x="5464976" y="356616"/>
+            <a:ext cx="4239300" cy="363384"/>
           </a:xfrm>
           <a:prstGeom prst="rect">
             <a:avLst/>
@@ -3020,8 +3020,8 @@
         </p:nvSpPr>
         <p:spPr>
           <a:xfrm>
-            <a:off x="276489" y="6355257"/>
-            <a:ext cx="1094880" cy="184666"/>
+            <a:off x="358889" y="7002464"/>
+            <a:ext cx="1095721" cy="185737"/>
           </a:xfrm>
           <a:prstGeom prst="rect">
             <a:avLst/>
@@ -3086,8 +3086,8 @@
         </p:nvSpPr>
         <p:spPr>
           <a:xfrm>
-            <a:off x="1419005" y="6355257"/>
-            <a:ext cx="570249" cy="184666"/>
+            <a:off x="1589590" y="7002464"/>
+            <a:ext cx="571680" cy="185737"/>
           </a:xfrm>
           <a:prstGeom prst="rect">
             <a:avLst/>
@@ -3155,8 +3155,8 @@
         </p:nvSpPr>
         <p:spPr>
           <a:xfrm>
-            <a:off x="6939167" y="1243501"/>
-            <a:ext cx="1878726" cy="4786463"/>
+            <a:off x="7636698" y="1368426"/>
+            <a:ext cx="2067577" cy="5267325"/>
           </a:xfrm>
         </p:spPr>
         <p:txBody>
@@ -3215,8 +3215,8 @@
         </p:nvSpPr>
         <p:spPr>
           <a:xfrm>
-            <a:off x="4735775" y="1243501"/>
-            <a:ext cx="1877284" cy="4786463"/>
+            <a:off x="5211819" y="1368426"/>
+            <a:ext cx="2065990" cy="5267325"/>
           </a:xfrm>
         </p:spPr>
         <p:txBody>
@@ -3275,8 +3275,8 @@
         </p:nvSpPr>
         <p:spPr>
           <a:xfrm>
-            <a:off x="2530941" y="1243501"/>
-            <a:ext cx="1877284" cy="4786463"/>
+            <a:off x="2785354" y="1368426"/>
+            <a:ext cx="2065990" cy="5267325"/>
           </a:xfrm>
         </p:spPr>
         <p:txBody>
@@ -3335,8 +3335,8 @@
         </p:nvSpPr>
         <p:spPr>
           <a:xfrm>
-            <a:off x="326109" y="1243501"/>
-            <a:ext cx="1878726" cy="4786463"/>
+            <a:off x="358889" y="1368426"/>
+            <a:ext cx="2067577" cy="5267325"/>
           </a:xfrm>
         </p:spPr>
         <p:txBody>
@@ -3400,8 +3400,8 @@
         </p:blipFill>
         <p:spPr>
           <a:xfrm>
-            <a:off x="7591094" y="324061"/>
-            <a:ext cx="1226800" cy="316789"/>
+            <a:off x="8354157" y="356616"/>
+            <a:ext cx="1350119" cy="348615"/>
           </a:xfrm>
           <a:prstGeom prst="rect">
             <a:avLst/>
@@ -3423,8 +3423,8 @@
         </p:nvSpPr>
         <p:spPr>
           <a:xfrm>
-            <a:off x="326107" y="327135"/>
-            <a:ext cx="6855679" cy="327135"/>
+            <a:off x="358888" y="360000"/>
+            <a:ext cx="7544818" cy="360000"/>
           </a:xfrm>
           <a:prstGeom prst="rect">
             <a:avLst/>
@@ -3516,8 +3516,8 @@
         </p:nvSpPr>
         <p:spPr bwMode="auto">
           <a:xfrm>
-            <a:off x="326108" y="6369853"/>
-            <a:ext cx="2454158" cy="163568"/>
+            <a:off x="358889" y="7009788"/>
+            <a:ext cx="2700852" cy="180000"/>
           </a:xfrm>
           <a:prstGeom prst="rect">
             <a:avLst/>
@@ -3577,8 +3577,8 @@
         </p:nvCxnSpPr>
         <p:spPr>
           <a:xfrm>
-            <a:off x="326108" y="916037"/>
-            <a:ext cx="8490341" cy="1442"/>
+            <a:off x="358888" y="1008064"/>
+            <a:ext cx="9343798" cy="1587"/>
           </a:xfrm>
           <a:prstGeom prst="line">
             <a:avLst/>
@@ -3619,8 +3619,8 @@
         </p:nvSpPr>
         <p:spPr>
           <a:xfrm>
-            <a:off x="326107" y="6531978"/>
-            <a:ext cx="369396" cy="163011"/>
+            <a:off x="358888" y="7188200"/>
+            <a:ext cx="406528" cy="179388"/>
           </a:xfrm>
           <a:prstGeom prst="rect">
             <a:avLst/>
@@ -3668,8 +3668,8 @@
         </p:nvSpPr>
         <p:spPr bwMode="auto">
           <a:xfrm>
-            <a:off x="2927914" y="6270270"/>
-            <a:ext cx="5889979" cy="261708"/>
+            <a:off x="3222230" y="6900200"/>
+            <a:ext cx="6482045" cy="288000"/>
           </a:xfrm>
           <a:prstGeom prst="rect">
             <a:avLst/>
@@ -3729,8 +3729,8 @@
         </p:nvSpPr>
         <p:spPr>
           <a:xfrm>
-            <a:off x="7999840" y="6270270"/>
-            <a:ext cx="818053" cy="261708"/>
+            <a:off x="8803991" y="6900200"/>
+            <a:ext cx="900284" cy="288000"/>
           </a:xfrm>
           <a:prstGeom prst="rect">
             <a:avLst/>
@@ -3785,8 +3785,8 @@
         </p:nvSpPr>
         <p:spPr>
           <a:xfrm>
-            <a:off x="7836230" y="6017297"/>
-            <a:ext cx="163611" cy="261708"/>
+            <a:off x="8623934" y="6621812"/>
+            <a:ext cx="180057" cy="288000"/>
           </a:xfrm>
           <a:prstGeom prst="rect">
             <a:avLst/>
@@ -3827,8 +3827,8 @@
         </p:nvCxnSpPr>
         <p:spPr bwMode="auto">
           <a:xfrm rot="16200000" flipH="1">
-            <a:off x="5742271" y="6401426"/>
-            <a:ext cx="261106" cy="0"/>
+            <a:off x="6319496" y="7044532"/>
+            <a:ext cx="287337" cy="0"/>
           </a:xfrm>
           <a:prstGeom prst="line">
             <a:avLst/>
@@ -3856,8 +3856,8 @@
         </p:nvSpPr>
         <p:spPr>
           <a:xfrm>
-            <a:off x="1337749" y="6218430"/>
-            <a:ext cx="98166" cy="163568"/>
+            <a:off x="1472221" y="6843152"/>
+            <a:ext cx="108034" cy="180000"/>
           </a:xfrm>
           <a:prstGeom prst="rect">
             <a:avLst/>
@@ -3900,8 +3900,8 @@
         </p:nvSpPr>
         <p:spPr bwMode="auto">
           <a:xfrm>
-            <a:off x="326107" y="6016981"/>
-            <a:ext cx="2454465" cy="164454"/>
+            <a:off x="358888" y="6621464"/>
+            <a:ext cx="2701190" cy="180975"/>
           </a:xfrm>
           <a:prstGeom prst="rect">
             <a:avLst/>
@@ -3954,8 +3954,8 @@
         </p:nvSpPr>
         <p:spPr bwMode="auto">
           <a:xfrm>
-            <a:off x="4965809" y="324060"/>
-            <a:ext cx="3852085" cy="330210"/>
+            <a:off x="5464976" y="356616"/>
+            <a:ext cx="4239300" cy="363384"/>
           </a:xfrm>
           <a:prstGeom prst="rect">
             <a:avLst/>
@@ -4015,8 +4015,8 @@
         </p:nvSpPr>
         <p:spPr>
           <a:xfrm>
-            <a:off x="276489" y="6355257"/>
-            <a:ext cx="1094880" cy="184666"/>
+            <a:off x="358889" y="7002464"/>
+            <a:ext cx="1095721" cy="185737"/>
           </a:xfrm>
           <a:prstGeom prst="rect">
             <a:avLst/>
@@ -4081,8 +4081,8 @@
         </p:nvSpPr>
         <p:spPr>
           <a:xfrm>
-            <a:off x="1419005" y="6355257"/>
-            <a:ext cx="570249" cy="184666"/>
+            <a:off x="1589590" y="7002464"/>
+            <a:ext cx="571680" cy="185737"/>
           </a:xfrm>
           <a:prstGeom prst="rect">
             <a:avLst/>
@@ -4150,8 +4150,8 @@
         </p:nvSpPr>
         <p:spPr>
           <a:xfrm>
-            <a:off x="326108" y="1243113"/>
-            <a:ext cx="8490670" cy="4786849"/>
+            <a:off x="358889" y="1368000"/>
+            <a:ext cx="9344160" cy="5267750"/>
           </a:xfrm>
           <a:prstGeom prst="rect">
             <a:avLst/>
@@ -4370,8 +4370,8 @@
         </p:blipFill>
         <p:spPr>
           <a:xfrm>
-            <a:off x="7591094" y="324061"/>
-            <a:ext cx="1226800" cy="316789"/>
+            <a:off x="8354157" y="356616"/>
+            <a:ext cx="1350119" cy="348615"/>
           </a:xfrm>
           <a:prstGeom prst="rect">
             <a:avLst/>
@@ -4393,8 +4393,8 @@
         </p:nvSpPr>
         <p:spPr>
           <a:xfrm>
-            <a:off x="326107" y="327135"/>
-            <a:ext cx="6855679" cy="327135"/>
+            <a:off x="358888" y="360000"/>
+            <a:ext cx="7544818" cy="360000"/>
           </a:xfrm>
           <a:prstGeom prst="rect">
             <a:avLst/>
@@ -4486,8 +4486,8 @@
         </p:nvSpPr>
         <p:spPr bwMode="auto">
           <a:xfrm>
-            <a:off x="326108" y="6369853"/>
-            <a:ext cx="2454158" cy="163568"/>
+            <a:off x="358889" y="7009788"/>
+            <a:ext cx="2700852" cy="180000"/>
           </a:xfrm>
           <a:prstGeom prst="rect">
             <a:avLst/>
@@ -4547,8 +4547,8 @@
         </p:nvCxnSpPr>
         <p:spPr>
           <a:xfrm>
-            <a:off x="326108" y="916037"/>
-            <a:ext cx="8490341" cy="1442"/>
+            <a:off x="358888" y="1008064"/>
+            <a:ext cx="9343798" cy="1587"/>
           </a:xfrm>
           <a:prstGeom prst="line">
             <a:avLst/>
@@ -4589,8 +4589,8 @@
         </p:nvSpPr>
         <p:spPr>
           <a:xfrm>
-            <a:off x="326107" y="6531978"/>
-            <a:ext cx="369396" cy="163011"/>
+            <a:off x="358888" y="7188200"/>
+            <a:ext cx="406528" cy="179388"/>
           </a:xfrm>
           <a:prstGeom prst="rect">
             <a:avLst/>
@@ -4638,8 +4638,8 @@
         </p:nvSpPr>
         <p:spPr bwMode="auto">
           <a:xfrm>
-            <a:off x="2927914" y="6270270"/>
-            <a:ext cx="5889979" cy="261708"/>
+            <a:off x="3222230" y="6900200"/>
+            <a:ext cx="6482045" cy="288000"/>
           </a:xfrm>
           <a:prstGeom prst="rect">
             <a:avLst/>
@@ -4699,8 +4699,8 @@
         </p:nvSpPr>
         <p:spPr>
           <a:xfrm>
-            <a:off x="7999840" y="6270270"/>
-            <a:ext cx="818053" cy="261708"/>
+            <a:off x="8803991" y="6900200"/>
+            <a:ext cx="900284" cy="288000"/>
           </a:xfrm>
           <a:prstGeom prst="rect">
             <a:avLst/>
@@ -4755,8 +4755,8 @@
         </p:nvSpPr>
         <p:spPr>
           <a:xfrm>
-            <a:off x="7836230" y="6017297"/>
-            <a:ext cx="163611" cy="261708"/>
+            <a:off x="8623934" y="6621812"/>
+            <a:ext cx="180057" cy="288000"/>
           </a:xfrm>
           <a:prstGeom prst="rect">
             <a:avLst/>
@@ -4797,8 +4797,8 @@
         </p:nvCxnSpPr>
         <p:spPr bwMode="auto">
           <a:xfrm rot="16200000" flipH="1">
-            <a:off x="5742271" y="6401426"/>
-            <a:ext cx="261106" cy="0"/>
+            <a:off x="6319496" y="7044532"/>
+            <a:ext cx="287337" cy="0"/>
           </a:xfrm>
           <a:prstGeom prst="line">
             <a:avLst/>
@@ -4826,8 +4826,8 @@
         </p:nvSpPr>
         <p:spPr>
           <a:xfrm>
-            <a:off x="1337749" y="6218430"/>
-            <a:ext cx="98166" cy="163568"/>
+            <a:off x="1472221" y="6843152"/>
+            <a:ext cx="108034" cy="180000"/>
           </a:xfrm>
           <a:prstGeom prst="rect">
             <a:avLst/>
@@ -4870,8 +4870,8 @@
         </p:nvSpPr>
         <p:spPr bwMode="auto">
           <a:xfrm>
-            <a:off x="326107" y="6016981"/>
-            <a:ext cx="2454465" cy="164454"/>
+            <a:off x="358888" y="6621464"/>
+            <a:ext cx="2701190" cy="180975"/>
           </a:xfrm>
           <a:prstGeom prst="rect">
             <a:avLst/>
@@ -4924,8 +4924,8 @@
         </p:nvSpPr>
         <p:spPr bwMode="auto">
           <a:xfrm>
-            <a:off x="4965809" y="324060"/>
-            <a:ext cx="3852085" cy="330210"/>
+            <a:off x="5464976" y="356616"/>
+            <a:ext cx="4239300" cy="363384"/>
           </a:xfrm>
           <a:prstGeom prst="rect">
             <a:avLst/>
@@ -4985,8 +4985,8 @@
         </p:nvSpPr>
         <p:spPr>
           <a:xfrm>
-            <a:off x="276489" y="6355257"/>
-            <a:ext cx="1094880" cy="184666"/>
+            <a:off x="358889" y="7002464"/>
+            <a:ext cx="1095721" cy="185737"/>
           </a:xfrm>
           <a:prstGeom prst="rect">
             <a:avLst/>
@@ -5051,8 +5051,8 @@
         </p:nvSpPr>
         <p:spPr>
           <a:xfrm>
-            <a:off x="1419005" y="6355257"/>
-            <a:ext cx="570249" cy="184666"/>
+            <a:off x="1589590" y="7002464"/>
+            <a:ext cx="571680" cy="185737"/>
           </a:xfrm>
           <a:prstGeom prst="rect">
             <a:avLst/>
@@ -5120,8 +5120,8 @@
         </p:nvSpPr>
         <p:spPr>
           <a:xfrm>
-            <a:off x="4737220" y="1243113"/>
-            <a:ext cx="4080673" cy="4786849"/>
+            <a:off x="5213410" y="1368000"/>
+            <a:ext cx="4490866" cy="5267750"/>
           </a:xfrm>
           <a:prstGeom prst="rect">
             <a:avLst/>
@@ -5336,8 +5336,8 @@
         </p:nvSpPr>
         <p:spPr>
           <a:xfrm>
-            <a:off x="326109" y="1243113"/>
-            <a:ext cx="4080673" cy="4786849"/>
+            <a:off x="358890" y="1368000"/>
+            <a:ext cx="4490866" cy="5267750"/>
           </a:xfrm>
           <a:prstGeom prst="rect">
             <a:avLst/>
@@ -5557,8 +5557,8 @@
         </p:blipFill>
         <p:spPr>
           <a:xfrm>
-            <a:off x="7591094" y="324061"/>
-            <a:ext cx="1226800" cy="316789"/>
+            <a:off x="8354157" y="356616"/>
+            <a:ext cx="1350119" cy="348615"/>
           </a:xfrm>
           <a:prstGeom prst="rect">
             <a:avLst/>
@@ -5580,8 +5580,8 @@
         </p:nvSpPr>
         <p:spPr>
           <a:xfrm>
-            <a:off x="326107" y="327135"/>
-            <a:ext cx="6855679" cy="327135"/>
+            <a:off x="358888" y="360000"/>
+            <a:ext cx="7544818" cy="360000"/>
           </a:xfrm>
           <a:prstGeom prst="rect">
             <a:avLst/>
@@ -5682,8 +5682,8 @@
         </p:blipFill>
         <p:spPr bwMode="auto">
           <a:xfrm>
-            <a:off x="0" y="5822233"/>
-            <a:ext cx="9144000" cy="1058850"/>
+            <a:off x="0" y="6407151"/>
+            <a:ext cx="10063163" cy="1165225"/>
           </a:xfrm>
           <a:prstGeom prst="rect">
             <a:avLst/>
@@ -5718,8 +5718,8 @@
         </p:blipFill>
         <p:spPr bwMode="auto">
           <a:xfrm>
-            <a:off x="-10521" y="-10098"/>
-            <a:ext cx="9152373" cy="4939377"/>
+            <a:off x="-11579" y="-11113"/>
+            <a:ext cx="10072378" cy="5435601"/>
           </a:xfrm>
           <a:prstGeom prst="rect">
             <a:avLst/>
@@ -5745,8 +5745,8 @@
         </p:nvSpPr>
         <p:spPr bwMode="auto">
           <a:xfrm>
-            <a:off x="0" y="4907641"/>
-            <a:ext cx="9144000" cy="989606"/>
+            <a:off x="0" y="5400676"/>
+            <a:ext cx="10063163" cy="1089025"/>
           </a:xfrm>
           <a:prstGeom prst="rect">
             <a:avLst/>
@@ -5801,8 +5801,8 @@
         </p:nvSpPr>
         <p:spPr bwMode="auto">
           <a:xfrm>
-            <a:off x="2927914" y="5247119"/>
-            <a:ext cx="5889979" cy="261708"/>
+            <a:off x="3222230" y="5774260"/>
+            <a:ext cx="6482045" cy="288000"/>
           </a:xfrm>
           <a:prstGeom prst="rect">
             <a:avLst/>
@@ -5855,8 +5855,8 @@
         </p:nvSpPr>
         <p:spPr>
           <a:xfrm>
-            <a:off x="7999840" y="5247119"/>
-            <a:ext cx="818053" cy="261708"/>
+            <a:off x="8803991" y="5774260"/>
+            <a:ext cx="900284" cy="288000"/>
           </a:xfrm>
           <a:prstGeom prst="rect">
             <a:avLst/>
@@ -5911,8 +5911,8 @@
         </p:nvSpPr>
         <p:spPr>
           <a:xfrm>
-            <a:off x="7836230" y="4994145"/>
-            <a:ext cx="163611" cy="261708"/>
+            <a:off x="8623934" y="5495872"/>
+            <a:ext cx="180057" cy="288000"/>
           </a:xfrm>
           <a:prstGeom prst="rect">
             <a:avLst/>
@@ -5953,8 +5953,8 @@
         </p:nvCxnSpPr>
         <p:spPr bwMode="auto">
           <a:xfrm rot="16200000" flipH="1">
-            <a:off x="5741549" y="5377919"/>
-            <a:ext cx="262549" cy="0"/>
+            <a:off x="6318702" y="5918201"/>
+            <a:ext cx="288925" cy="0"/>
           </a:xfrm>
           <a:prstGeom prst="line">
             <a:avLst/>
@@ -5982,8 +5982,8 @@
         </p:nvSpPr>
         <p:spPr bwMode="auto">
           <a:xfrm>
-            <a:off x="326830" y="5160831"/>
-            <a:ext cx="3755232" cy="451296"/>
+            <a:off x="359683" y="5679304"/>
+            <a:ext cx="4132711" cy="496634"/>
           </a:xfrm>
           <a:prstGeom prst="rect">
             <a:avLst/>
@@ -6046,8 +6046,8 @@
         </p:nvSpPr>
         <p:spPr>
           <a:xfrm>
-            <a:off x="326109" y="1146848"/>
-            <a:ext cx="8500443" cy="654270"/>
+            <a:off x="358889" y="1262064"/>
+            <a:ext cx="9354915" cy="720000"/>
           </a:xfrm>
           <a:prstGeom prst="rect">
             <a:avLst/>
@@ -6139,8 +6139,8 @@
         </p:nvSpPr>
         <p:spPr>
           <a:xfrm>
-            <a:off x="326108" y="1942034"/>
-            <a:ext cx="8499721" cy="327135"/>
+            <a:off x="358889" y="2137136"/>
+            <a:ext cx="9354120" cy="360000"/>
           </a:xfrm>
           <a:prstGeom prst="rect">
             <a:avLst/>
@@ -6236,8 +6236,8 @@
         </p:nvSpPr>
         <p:spPr>
           <a:xfrm>
-            <a:off x="326109" y="2534421"/>
-            <a:ext cx="8500443" cy="261708"/>
+            <a:off x="358889" y="2789036"/>
+            <a:ext cx="9354915" cy="288000"/>
           </a:xfrm>
           <a:prstGeom prst="rect">
             <a:avLst/>
@@ -6327,8 +6327,8 @@
         </p:nvSpPr>
         <p:spPr>
           <a:xfrm>
-            <a:off x="326109" y="2796128"/>
-            <a:ext cx="8500443" cy="228995"/>
+            <a:off x="358889" y="3077036"/>
+            <a:ext cx="9354915" cy="252000"/>
           </a:xfrm>
           <a:prstGeom prst="rect">
             <a:avLst/>
@@ -6423,8 +6423,8 @@
         </p:blipFill>
         <p:spPr>
           <a:xfrm>
-            <a:off x="326828" y="5154167"/>
-            <a:ext cx="1799306" cy="464624"/>
+            <a:off x="359681" y="5671970"/>
+            <a:ext cx="1980174" cy="511302"/>
           </a:xfrm>
           <a:prstGeom prst="rect">
             <a:avLst/>
@@ -6478,7 +6478,7 @@
         <p:spPr bwMode="auto">
           <a:xfrm>
             <a:off x="0" y="0"/>
-            <a:ext cx="9144000" cy="5424081"/>
+            <a:ext cx="10063163" cy="5969000"/>
           </a:xfrm>
           <a:prstGeom prst="rect">
             <a:avLst/>
@@ -6504,8 +6504,8 @@
         </p:nvSpPr>
         <p:spPr bwMode="auto">
           <a:xfrm>
-            <a:off x="2927914" y="6270270"/>
-            <a:ext cx="5889979" cy="261708"/>
+            <a:off x="3222230" y="6900200"/>
+            <a:ext cx="6482045" cy="288000"/>
           </a:xfrm>
           <a:prstGeom prst="rect">
             <a:avLst/>
@@ -6566,8 +6566,8 @@
         </p:nvSpPr>
         <p:spPr>
           <a:xfrm>
-            <a:off x="7999840" y="6270270"/>
-            <a:ext cx="818053" cy="261708"/>
+            <a:off x="8803991" y="6900200"/>
+            <a:ext cx="900284" cy="288000"/>
           </a:xfrm>
           <a:prstGeom prst="rect">
             <a:avLst/>
@@ -6622,8 +6622,8 @@
         </p:nvSpPr>
         <p:spPr>
           <a:xfrm>
-            <a:off x="7836230" y="6017297"/>
-            <a:ext cx="163611" cy="261708"/>
+            <a:off x="8623934" y="6621812"/>
+            <a:ext cx="180057" cy="288000"/>
           </a:xfrm>
           <a:prstGeom prst="rect">
             <a:avLst/>
@@ -6664,8 +6664,8 @@
         </p:nvCxnSpPr>
         <p:spPr bwMode="auto">
           <a:xfrm rot="16200000" flipH="1">
-            <a:off x="5742271" y="6401426"/>
-            <a:ext cx="261106" cy="0"/>
+            <a:off x="6319496" y="7044532"/>
+            <a:ext cx="287337" cy="0"/>
           </a:xfrm>
           <a:prstGeom prst="line">
             <a:avLst/>
@@ -6693,8 +6693,8 @@
         </p:nvSpPr>
         <p:spPr bwMode="auto">
           <a:xfrm>
-            <a:off x="324146" y="6074047"/>
-            <a:ext cx="3755232" cy="451296"/>
+            <a:off x="356729" y="6684264"/>
+            <a:ext cx="4132711" cy="496634"/>
           </a:xfrm>
           <a:prstGeom prst="rect">
             <a:avLst/>
@@ -6757,8 +6757,8 @@
         </p:nvSpPr>
         <p:spPr>
           <a:xfrm>
-            <a:off x="326109" y="1146848"/>
-            <a:ext cx="8500443" cy="654270"/>
+            <a:off x="358889" y="1262064"/>
+            <a:ext cx="9354915" cy="720000"/>
           </a:xfrm>
           <a:prstGeom prst="rect">
             <a:avLst/>
@@ -6850,8 +6850,8 @@
         </p:nvSpPr>
         <p:spPr>
           <a:xfrm>
-            <a:off x="326108" y="1942034"/>
-            <a:ext cx="8499721" cy="327135"/>
+            <a:off x="358889" y="2137136"/>
+            <a:ext cx="9354120" cy="360000"/>
           </a:xfrm>
           <a:prstGeom prst="rect">
             <a:avLst/>
@@ -6949,8 +6949,8 @@
         </p:nvSpPr>
         <p:spPr>
           <a:xfrm>
-            <a:off x="326109" y="2534421"/>
-            <a:ext cx="8500443" cy="261708"/>
+            <a:off x="358889" y="2789036"/>
+            <a:ext cx="9354915" cy="288000"/>
           </a:xfrm>
           <a:prstGeom prst="rect">
             <a:avLst/>
@@ -7048,8 +7048,8 @@
         </p:nvSpPr>
         <p:spPr>
           <a:xfrm>
-            <a:off x="326109" y="2796128"/>
-            <a:ext cx="8500443" cy="228995"/>
+            <a:off x="358889" y="3077036"/>
+            <a:ext cx="9354915" cy="252000"/>
           </a:xfrm>
           <a:prstGeom prst="rect">
             <a:avLst/>
@@ -7146,8 +7146,8 @@
         </p:blipFill>
         <p:spPr>
           <a:xfrm>
-            <a:off x="324145" y="6060718"/>
-            <a:ext cx="1799306" cy="464624"/>
+            <a:off x="356728" y="6669595"/>
+            <a:ext cx="1980174" cy="511302"/>
           </a:xfrm>
           <a:prstGeom prst="rect">
             <a:avLst/>
@@ -7200,8 +7200,8 @@
         </p:blipFill>
         <p:spPr bwMode="auto">
           <a:xfrm>
-            <a:off x="-8657" y="1742632"/>
-            <a:ext cx="9155544" cy="3697319"/>
+            <a:off x="-9528" y="1917701"/>
+            <a:ext cx="10075867" cy="4068763"/>
           </a:xfrm>
           <a:prstGeom prst="rect">
             <a:avLst/>
@@ -7227,8 +7227,8 @@
         </p:nvSpPr>
         <p:spPr bwMode="auto">
           <a:xfrm>
-            <a:off x="5545682" y="323264"/>
-            <a:ext cx="3272210" cy="163568"/>
+            <a:off x="6103139" y="355740"/>
+            <a:ext cx="3601136" cy="180000"/>
           </a:xfrm>
           <a:prstGeom prst="rect">
             <a:avLst/>
@@ -7291,8 +7291,8 @@
         </p:nvSpPr>
         <p:spPr>
           <a:xfrm>
-            <a:off x="7756762" y="314474"/>
-            <a:ext cx="1094880" cy="184666"/>
+            <a:off x="8573618" y="355600"/>
+            <a:ext cx="1130657" cy="184150"/>
           </a:xfrm>
           <a:prstGeom prst="rect">
             <a:avLst/>
@@ -7360,8 +7360,8 @@
         </p:nvSpPr>
         <p:spPr>
           <a:xfrm>
-            <a:off x="7101762" y="314474"/>
-            <a:ext cx="605515" cy="184666"/>
+            <a:off x="7846314" y="355600"/>
+            <a:ext cx="605028" cy="184150"/>
           </a:xfrm>
           <a:prstGeom prst="rect">
             <a:avLst/>
@@ -7429,8 +7429,8 @@
         </p:nvSpPr>
         <p:spPr>
           <a:xfrm>
-            <a:off x="7692526" y="159696"/>
-            <a:ext cx="98166" cy="163568"/>
+            <a:off x="8465785" y="175740"/>
+            <a:ext cx="108034" cy="180000"/>
           </a:xfrm>
           <a:prstGeom prst="rect">
             <a:avLst/>
@@ -7476,8 +7476,8 @@
         </p:nvSpPr>
         <p:spPr bwMode="auto">
           <a:xfrm>
-            <a:off x="6854032" y="602997"/>
-            <a:ext cx="1963861" cy="164454"/>
+            <a:off x="7543005" y="663576"/>
+            <a:ext cx="2161270" cy="180975"/>
           </a:xfrm>
           <a:prstGeom prst="rect">
             <a:avLst/>
@@ -7533,8 +7533,8 @@
         </p:nvSpPr>
         <p:spPr bwMode="auto">
           <a:xfrm>
-            <a:off x="2927914" y="6270270"/>
-            <a:ext cx="5889979" cy="261708"/>
+            <a:off x="3222230" y="6900200"/>
+            <a:ext cx="6482045" cy="288000"/>
           </a:xfrm>
           <a:prstGeom prst="rect">
             <a:avLst/>
@@ -7595,8 +7595,8 @@
         </p:nvSpPr>
         <p:spPr>
           <a:xfrm>
-            <a:off x="7999840" y="6270270"/>
-            <a:ext cx="818053" cy="261708"/>
+            <a:off x="8803991" y="6900200"/>
+            <a:ext cx="900284" cy="288000"/>
           </a:xfrm>
           <a:prstGeom prst="rect">
             <a:avLst/>
@@ -7651,8 +7651,8 @@
         </p:nvSpPr>
         <p:spPr>
           <a:xfrm>
-            <a:off x="7836230" y="6017297"/>
-            <a:ext cx="163611" cy="261708"/>
+            <a:off x="8623934" y="6621812"/>
+            <a:ext cx="180057" cy="288000"/>
           </a:xfrm>
           <a:prstGeom prst="rect">
             <a:avLst/>
@@ -7693,8 +7693,8 @@
         </p:nvCxnSpPr>
         <p:spPr bwMode="auto">
           <a:xfrm rot="16200000" flipH="1">
-            <a:off x="5742271" y="6401426"/>
-            <a:ext cx="261106" cy="0"/>
+            <a:off x="6319496" y="7044532"/>
+            <a:ext cx="287337" cy="0"/>
           </a:xfrm>
           <a:prstGeom prst="line">
             <a:avLst/>
@@ -7722,8 +7722,8 @@
         </p:nvSpPr>
         <p:spPr bwMode="auto">
           <a:xfrm>
-            <a:off x="324146" y="6074047"/>
-            <a:ext cx="3755232" cy="451296"/>
+            <a:off x="356729" y="6684264"/>
+            <a:ext cx="4132711" cy="496634"/>
           </a:xfrm>
           <a:prstGeom prst="rect">
             <a:avLst/>
@@ -7786,8 +7786,8 @@
         </p:nvSpPr>
         <p:spPr>
           <a:xfrm>
-            <a:off x="326109" y="2046300"/>
-            <a:ext cx="8500443" cy="654270"/>
+            <a:off x="358889" y="2251877"/>
+            <a:ext cx="9354915" cy="720000"/>
           </a:xfrm>
           <a:prstGeom prst="rect">
             <a:avLst/>
@@ -7879,8 +7879,8 @@
         </p:nvSpPr>
         <p:spPr>
           <a:xfrm>
-            <a:off x="326108" y="2841485"/>
-            <a:ext cx="8499721" cy="327135"/>
+            <a:off x="358889" y="3126949"/>
+            <a:ext cx="9354120" cy="360000"/>
           </a:xfrm>
           <a:prstGeom prst="rect">
             <a:avLst/>
@@ -7978,8 +7978,8 @@
         </p:nvSpPr>
         <p:spPr>
           <a:xfrm>
-            <a:off x="326109" y="3433872"/>
-            <a:ext cx="8500443" cy="261708"/>
+            <a:off x="358889" y="3778849"/>
+            <a:ext cx="9354915" cy="288000"/>
           </a:xfrm>
           <a:prstGeom prst="rect">
             <a:avLst/>
@@ -8071,8 +8071,8 @@
         </p:nvSpPr>
         <p:spPr>
           <a:xfrm>
-            <a:off x="326109" y="3695580"/>
-            <a:ext cx="8500443" cy="228995"/>
+            <a:off x="358889" y="4066849"/>
+            <a:ext cx="9354915" cy="252000"/>
           </a:xfrm>
           <a:prstGeom prst="rect">
             <a:avLst/>
@@ -8169,8 +8169,8 @@
         </p:blipFill>
         <p:spPr>
           <a:xfrm>
-            <a:off x="324145" y="6060718"/>
-            <a:ext cx="1799306" cy="464624"/>
+            <a:off x="356728" y="6669595"/>
+            <a:ext cx="1980174" cy="511302"/>
           </a:xfrm>
           <a:prstGeom prst="rect">
             <a:avLst/>
@@ -8223,8 +8223,8 @@
         </p:blipFill>
         <p:spPr bwMode="auto">
           <a:xfrm>
-            <a:off x="0" y="4434476"/>
-            <a:ext cx="9144000" cy="1058850"/>
+            <a:off x="0" y="4879976"/>
+            <a:ext cx="10063163" cy="1165225"/>
           </a:xfrm>
           <a:prstGeom prst="rect">
             <a:avLst/>
@@ -8250,8 +8250,8 @@
         </p:nvSpPr>
         <p:spPr bwMode="auto">
           <a:xfrm>
-            <a:off x="5545682" y="323264"/>
-            <a:ext cx="3272210" cy="163568"/>
+            <a:off x="6103139" y="355740"/>
+            <a:ext cx="3601136" cy="180000"/>
           </a:xfrm>
           <a:prstGeom prst="rect">
             <a:avLst/>
@@ -8290,8 +8290,8 @@
         </p:nvSpPr>
         <p:spPr bwMode="auto">
           <a:xfrm>
-            <a:off x="2927914" y="6270270"/>
-            <a:ext cx="5889979" cy="261708"/>
+            <a:off x="3222230" y="6900200"/>
+            <a:ext cx="6482045" cy="288000"/>
           </a:xfrm>
           <a:prstGeom prst="rect">
             <a:avLst/>
@@ -8352,8 +8352,8 @@
         </p:nvSpPr>
         <p:spPr>
           <a:xfrm>
-            <a:off x="7999840" y="6270270"/>
-            <a:ext cx="818053" cy="261708"/>
+            <a:off x="8803991" y="6900200"/>
+            <a:ext cx="900284" cy="288000"/>
           </a:xfrm>
           <a:prstGeom prst="rect">
             <a:avLst/>
@@ -8408,8 +8408,8 @@
         </p:nvSpPr>
         <p:spPr>
           <a:xfrm>
-            <a:off x="7836230" y="6017297"/>
-            <a:ext cx="163611" cy="261708"/>
+            <a:off x="8623934" y="6621812"/>
+            <a:ext cx="180057" cy="288000"/>
           </a:xfrm>
           <a:prstGeom prst="rect">
             <a:avLst/>
@@ -8450,8 +8450,8 @@
         </p:nvCxnSpPr>
         <p:spPr bwMode="auto">
           <a:xfrm rot="16200000" flipH="1">
-            <a:off x="5742271" y="6401426"/>
-            <a:ext cx="261106" cy="0"/>
+            <a:off x="6319496" y="7044532"/>
+            <a:ext cx="287337" cy="0"/>
           </a:xfrm>
           <a:prstGeom prst="line">
             <a:avLst/>
@@ -8479,8 +8479,8 @@
         </p:nvSpPr>
         <p:spPr>
           <a:xfrm>
-            <a:off x="7692526" y="159696"/>
-            <a:ext cx="98166" cy="163568"/>
+            <a:off x="8465785" y="175740"/>
+            <a:ext cx="108034" cy="180000"/>
           </a:xfrm>
           <a:prstGeom prst="rect">
             <a:avLst/>
@@ -8523,8 +8523,8 @@
         </p:nvSpPr>
         <p:spPr bwMode="auto">
           <a:xfrm>
-            <a:off x="6854032" y="602997"/>
-            <a:ext cx="1963861" cy="164454"/>
+            <a:off x="7543005" y="663576"/>
+            <a:ext cx="2161270" cy="180975"/>
           </a:xfrm>
           <a:prstGeom prst="rect">
             <a:avLst/>
@@ -8577,8 +8577,8 @@
         </p:nvSpPr>
         <p:spPr bwMode="auto">
           <a:xfrm>
-            <a:off x="324146" y="6074047"/>
-            <a:ext cx="3755232" cy="451296"/>
+            <a:off x="356729" y="6684264"/>
+            <a:ext cx="4132711" cy="496634"/>
           </a:xfrm>
           <a:prstGeom prst="rect">
             <a:avLst/>
@@ -8638,8 +8638,8 @@
         </p:nvSpPr>
         <p:spPr>
           <a:xfrm>
-            <a:off x="7756762" y="314474"/>
-            <a:ext cx="1094880" cy="184666"/>
+            <a:off x="8573618" y="355600"/>
+            <a:ext cx="1130657" cy="184150"/>
           </a:xfrm>
           <a:prstGeom prst="rect">
             <a:avLst/>
@@ -8704,8 +8704,8 @@
         </p:nvSpPr>
         <p:spPr>
           <a:xfrm>
-            <a:off x="7101762" y="314474"/>
-            <a:ext cx="605515" cy="184666"/>
+            <a:off x="7846314" y="355600"/>
+            <a:ext cx="605028" cy="184150"/>
           </a:xfrm>
           <a:prstGeom prst="rect">
             <a:avLst/>
@@ -8773,8 +8773,8 @@
         </p:nvSpPr>
         <p:spPr>
           <a:xfrm>
-            <a:off x="326109" y="1146848"/>
-            <a:ext cx="8500443" cy="654270"/>
+            <a:off x="358889" y="1262064"/>
+            <a:ext cx="9354915" cy="720000"/>
           </a:xfrm>
           <a:prstGeom prst="rect">
             <a:avLst/>
@@ -8866,8 +8866,8 @@
         </p:nvSpPr>
         <p:spPr>
           <a:xfrm>
-            <a:off x="326108" y="1942034"/>
-            <a:ext cx="8499721" cy="327135"/>
+            <a:off x="358889" y="2137136"/>
+            <a:ext cx="9354120" cy="360000"/>
           </a:xfrm>
           <a:prstGeom prst="rect">
             <a:avLst/>
@@ -8965,8 +8965,8 @@
         </p:nvSpPr>
         <p:spPr>
           <a:xfrm>
-            <a:off x="326109" y="2534421"/>
-            <a:ext cx="8500443" cy="261708"/>
+            <a:off x="358889" y="2789036"/>
+            <a:ext cx="9354915" cy="288000"/>
           </a:xfrm>
           <a:prstGeom prst="rect">
             <a:avLst/>
@@ -9058,8 +9058,8 @@
         </p:nvSpPr>
         <p:spPr>
           <a:xfrm>
-            <a:off x="326109" y="2796128"/>
-            <a:ext cx="8500443" cy="228995"/>
+            <a:off x="358889" y="3077036"/>
+            <a:ext cx="9354915" cy="252000"/>
           </a:xfrm>
           <a:prstGeom prst="rect">
             <a:avLst/>
@@ -9156,8 +9156,8 @@
         </p:blipFill>
         <p:spPr>
           <a:xfrm>
-            <a:off x="324145" y="6060718"/>
-            <a:ext cx="1799306" cy="464624"/>
+            <a:off x="356728" y="6669595"/>
+            <a:ext cx="1980174" cy="511302"/>
           </a:xfrm>
           <a:prstGeom prst="rect">
             <a:avLst/>
@@ -9211,7 +9211,7 @@
         <p:spPr bwMode="auto">
           <a:xfrm>
             <a:off x="0" y="1"/>
-            <a:ext cx="9144000" cy="4907639"/>
+            <a:ext cx="10063163" cy="5400675"/>
           </a:xfrm>
           <a:prstGeom prst="rect">
             <a:avLst/>
@@ -9246,8 +9246,8 @@
         </p:blipFill>
         <p:spPr bwMode="auto">
           <a:xfrm>
-            <a:off x="1444" y="5874165"/>
-            <a:ext cx="9149771" cy="983836"/>
+            <a:off x="1589" y="6464301"/>
+            <a:ext cx="10069514" cy="1082675"/>
           </a:xfrm>
           <a:prstGeom prst="rect">
             <a:avLst/>
@@ -9273,8 +9273,8 @@
         </p:nvSpPr>
         <p:spPr bwMode="auto">
           <a:xfrm>
-            <a:off x="0" y="4907641"/>
-            <a:ext cx="9144000" cy="989606"/>
+            <a:off x="0" y="5400676"/>
+            <a:ext cx="10063163" cy="1089025"/>
           </a:xfrm>
           <a:prstGeom prst="rect">
             <a:avLst/>
@@ -9329,8 +9329,8 @@
         </p:nvSpPr>
         <p:spPr bwMode="auto">
           <a:xfrm>
-            <a:off x="2927914" y="5247119"/>
-            <a:ext cx="5889979" cy="261708"/>
+            <a:off x="3222230" y="5774260"/>
+            <a:ext cx="6482045" cy="288000"/>
           </a:xfrm>
           <a:prstGeom prst="rect">
             <a:avLst/>
@@ -9391,8 +9391,8 @@
         </p:nvSpPr>
         <p:spPr>
           <a:xfrm>
-            <a:off x="7999840" y="5247119"/>
-            <a:ext cx="818053" cy="261708"/>
+            <a:off x="8803991" y="5774260"/>
+            <a:ext cx="900284" cy="288000"/>
           </a:xfrm>
           <a:prstGeom prst="rect">
             <a:avLst/>
@@ -9447,8 +9447,8 @@
         </p:nvSpPr>
         <p:spPr>
           <a:xfrm>
-            <a:off x="7836230" y="4994145"/>
-            <a:ext cx="163611" cy="261708"/>
+            <a:off x="8623934" y="5495872"/>
+            <a:ext cx="180057" cy="288000"/>
           </a:xfrm>
           <a:prstGeom prst="rect">
             <a:avLst/>
@@ -9489,8 +9489,8 @@
         </p:nvCxnSpPr>
         <p:spPr bwMode="auto">
           <a:xfrm rot="16200000" flipH="1">
-            <a:off x="5741549" y="5377919"/>
-            <a:ext cx="262549" cy="0"/>
+            <a:off x="6318702" y="5918201"/>
+            <a:ext cx="288925" cy="0"/>
           </a:xfrm>
           <a:prstGeom prst="line">
             <a:avLst/>
@@ -9518,8 +9518,8 @@
         </p:nvSpPr>
         <p:spPr bwMode="auto">
           <a:xfrm>
-            <a:off x="326830" y="5160831"/>
-            <a:ext cx="3755232" cy="451296"/>
+            <a:off x="359683" y="5679304"/>
+            <a:ext cx="4132711" cy="496634"/>
           </a:xfrm>
           <a:prstGeom prst="rect">
             <a:avLst/>
@@ -9582,8 +9582,8 @@
         </p:nvSpPr>
         <p:spPr>
           <a:xfrm>
-            <a:off x="326109" y="1146848"/>
-            <a:ext cx="8500443" cy="654270"/>
+            <a:off x="358889" y="1262064"/>
+            <a:ext cx="9354915" cy="720000"/>
           </a:xfrm>
           <a:prstGeom prst="rect">
             <a:avLst/>
@@ -9675,8 +9675,8 @@
         </p:nvSpPr>
         <p:spPr>
           <a:xfrm>
-            <a:off x="326108" y="1942034"/>
-            <a:ext cx="8499721" cy="327135"/>
+            <a:off x="358889" y="2137136"/>
+            <a:ext cx="9354120" cy="360000"/>
           </a:xfrm>
           <a:prstGeom prst="rect">
             <a:avLst/>
@@ -9772,8 +9772,8 @@
         </p:nvSpPr>
         <p:spPr>
           <a:xfrm>
-            <a:off x="326109" y="2534421"/>
-            <a:ext cx="8500443" cy="261708"/>
+            <a:off x="358889" y="2789036"/>
+            <a:ext cx="9354915" cy="288000"/>
           </a:xfrm>
           <a:prstGeom prst="rect">
             <a:avLst/>
@@ -9863,8 +9863,8 @@
         </p:nvSpPr>
         <p:spPr>
           <a:xfrm>
-            <a:off x="326109" y="2796128"/>
-            <a:ext cx="8500443" cy="228995"/>
+            <a:off x="358889" y="3077036"/>
+            <a:ext cx="9354915" cy="252000"/>
           </a:xfrm>
           <a:prstGeom prst="rect">
             <a:avLst/>
@@ -9959,8 +9959,8 @@
         </p:blipFill>
         <p:spPr>
           <a:xfrm>
-            <a:off x="326828" y="5154167"/>
-            <a:ext cx="1799306" cy="464624"/>
+            <a:off x="359681" y="5671970"/>
+            <a:ext cx="1980174" cy="511302"/>
           </a:xfrm>
           <a:prstGeom prst="rect">
             <a:avLst/>
@@ -10013,8 +10013,8 @@
         </p:blipFill>
         <p:spPr bwMode="auto">
           <a:xfrm>
-            <a:off x="0" y="1731091"/>
-            <a:ext cx="9144000" cy="3713187"/>
+            <a:off x="0" y="1905001"/>
+            <a:ext cx="10063163" cy="4086225"/>
           </a:xfrm>
           <a:prstGeom prst="rect">
             <a:avLst/>
@@ -10040,8 +10040,8 @@
         </p:nvSpPr>
         <p:spPr bwMode="auto">
           <a:xfrm>
-            <a:off x="5545682" y="323264"/>
-            <a:ext cx="3272210" cy="163568"/>
+            <a:off x="6103139" y="355740"/>
+            <a:ext cx="3601136" cy="180000"/>
           </a:xfrm>
           <a:prstGeom prst="rect">
             <a:avLst/>
@@ -10101,8 +10101,8 @@
         </p:nvSpPr>
         <p:spPr bwMode="auto">
           <a:xfrm>
-            <a:off x="2927914" y="6270270"/>
-            <a:ext cx="5889979" cy="261708"/>
+            <a:off x="3222230" y="6900200"/>
+            <a:ext cx="6482045" cy="288000"/>
           </a:xfrm>
           <a:prstGeom prst="rect">
             <a:avLst/>
@@ -10163,8 +10163,8 @@
         </p:nvSpPr>
         <p:spPr>
           <a:xfrm>
-            <a:off x="7999840" y="6270270"/>
-            <a:ext cx="818053" cy="261708"/>
+            <a:off x="8803991" y="6900200"/>
+            <a:ext cx="900284" cy="288000"/>
           </a:xfrm>
           <a:prstGeom prst="rect">
             <a:avLst/>
@@ -10219,8 +10219,8 @@
         </p:nvSpPr>
         <p:spPr>
           <a:xfrm>
-            <a:off x="7836230" y="6017297"/>
-            <a:ext cx="163611" cy="261708"/>
+            <a:off x="8623934" y="6621812"/>
+            <a:ext cx="180057" cy="288000"/>
           </a:xfrm>
           <a:prstGeom prst="rect">
             <a:avLst/>
@@ -10261,8 +10261,8 @@
         </p:nvCxnSpPr>
         <p:spPr bwMode="auto">
           <a:xfrm rot="16200000" flipH="1">
-            <a:off x="5742271" y="6401426"/>
-            <a:ext cx="261106" cy="0"/>
+            <a:off x="6319496" y="7044532"/>
+            <a:ext cx="287337" cy="0"/>
           </a:xfrm>
           <a:prstGeom prst="line">
             <a:avLst/>
@@ -10290,8 +10290,8 @@
         </p:nvSpPr>
         <p:spPr>
           <a:xfrm>
-            <a:off x="7692526" y="159696"/>
-            <a:ext cx="98166" cy="163568"/>
+            <a:off x="8465785" y="175740"/>
+            <a:ext cx="108034" cy="180000"/>
           </a:xfrm>
           <a:prstGeom prst="rect">
             <a:avLst/>
@@ -10334,8 +10334,8 @@
         </p:nvSpPr>
         <p:spPr bwMode="auto">
           <a:xfrm>
-            <a:off x="6854032" y="602997"/>
-            <a:ext cx="1963861" cy="164454"/>
+            <a:off x="7543005" y="663576"/>
+            <a:ext cx="2161270" cy="180975"/>
           </a:xfrm>
           <a:prstGeom prst="rect">
             <a:avLst/>
@@ -10388,8 +10388,8 @@
         </p:nvSpPr>
         <p:spPr bwMode="auto">
           <a:xfrm>
-            <a:off x="324146" y="6074047"/>
-            <a:ext cx="3755232" cy="451296"/>
+            <a:off x="356729" y="6684264"/>
+            <a:ext cx="4132711" cy="496634"/>
           </a:xfrm>
           <a:prstGeom prst="rect">
             <a:avLst/>
@@ -10449,8 +10449,8 @@
         </p:nvSpPr>
         <p:spPr>
           <a:xfrm>
-            <a:off x="7756762" y="314474"/>
-            <a:ext cx="1094880" cy="184666"/>
+            <a:off x="8573618" y="355600"/>
+            <a:ext cx="1130657" cy="184150"/>
           </a:xfrm>
           <a:prstGeom prst="rect">
             <a:avLst/>
@@ -10515,8 +10515,8 @@
         </p:nvSpPr>
         <p:spPr>
           <a:xfrm>
-            <a:off x="7101762" y="314474"/>
-            <a:ext cx="605515" cy="184666"/>
+            <a:off x="7846314" y="355600"/>
+            <a:ext cx="605028" cy="184150"/>
           </a:xfrm>
           <a:prstGeom prst="rect">
             <a:avLst/>
@@ -10584,8 +10584,8 @@
         </p:nvSpPr>
         <p:spPr>
           <a:xfrm>
-            <a:off x="326109" y="2046300"/>
-            <a:ext cx="8500443" cy="654270"/>
+            <a:off x="358889" y="2251877"/>
+            <a:ext cx="9354915" cy="720000"/>
           </a:xfrm>
           <a:prstGeom prst="rect">
             <a:avLst/>
@@ -10677,8 +10677,8 @@
         </p:nvSpPr>
         <p:spPr>
           <a:xfrm>
-            <a:off x="326108" y="2841485"/>
-            <a:ext cx="8499721" cy="327135"/>
+            <a:off x="358889" y="3126949"/>
+            <a:ext cx="9354120" cy="360000"/>
           </a:xfrm>
           <a:prstGeom prst="rect">
             <a:avLst/>
@@ -10776,8 +10776,8 @@
         </p:nvSpPr>
         <p:spPr>
           <a:xfrm>
-            <a:off x="326109" y="3433872"/>
-            <a:ext cx="8500443" cy="261708"/>
+            <a:off x="358889" y="3778849"/>
+            <a:ext cx="9354915" cy="288000"/>
           </a:xfrm>
           <a:prstGeom prst="rect">
             <a:avLst/>
@@ -10869,8 +10869,8 @@
         </p:nvSpPr>
         <p:spPr>
           <a:xfrm>
-            <a:off x="326109" y="3695580"/>
-            <a:ext cx="8500443" cy="228995"/>
+            <a:off x="358889" y="4066849"/>
+            <a:ext cx="9354915" cy="252000"/>
           </a:xfrm>
           <a:prstGeom prst="rect">
             <a:avLst/>
@@ -10967,8 +10967,8 @@
         </p:blipFill>
         <p:spPr>
           <a:xfrm>
-            <a:off x="324145" y="6060718"/>
-            <a:ext cx="1799306" cy="464624"/>
+            <a:off x="356728" y="6669595"/>
+            <a:ext cx="1980174" cy="511302"/>
           </a:xfrm>
           <a:prstGeom prst="rect">
             <a:avLst/>
@@ -11012,8 +11012,8 @@
         </p:nvSpPr>
         <p:spPr bwMode="auto">
           <a:xfrm>
-            <a:off x="5545682" y="323264"/>
-            <a:ext cx="3272210" cy="163568"/>
+            <a:off x="6103139" y="355740"/>
+            <a:ext cx="3601136" cy="180000"/>
           </a:xfrm>
           <a:prstGeom prst="rect">
             <a:avLst/>
@@ -11073,8 +11073,8 @@
         </p:nvSpPr>
         <p:spPr bwMode="auto">
           <a:xfrm>
-            <a:off x="2927914" y="6270270"/>
-            <a:ext cx="5889979" cy="261708"/>
+            <a:off x="3222230" y="6900200"/>
+            <a:ext cx="6482045" cy="288000"/>
           </a:xfrm>
           <a:prstGeom prst="rect">
             <a:avLst/>
@@ -11135,8 +11135,8 @@
         </p:nvSpPr>
         <p:spPr>
           <a:xfrm>
-            <a:off x="7999840" y="6270270"/>
-            <a:ext cx="818053" cy="261708"/>
+            <a:off x="8803991" y="6900200"/>
+            <a:ext cx="900284" cy="288000"/>
           </a:xfrm>
           <a:prstGeom prst="rect">
             <a:avLst/>
@@ -11191,8 +11191,8 @@
         </p:nvSpPr>
         <p:spPr>
           <a:xfrm>
-            <a:off x="7836230" y="6017297"/>
-            <a:ext cx="163611" cy="261708"/>
+            <a:off x="8623934" y="6621812"/>
+            <a:ext cx="180057" cy="288000"/>
           </a:xfrm>
           <a:prstGeom prst="rect">
             <a:avLst/>
@@ -11233,8 +11233,8 @@
         </p:nvCxnSpPr>
         <p:spPr bwMode="auto">
           <a:xfrm rot="16200000" flipH="1">
-            <a:off x="5742271" y="6401426"/>
-            <a:ext cx="261106" cy="0"/>
+            <a:off x="6319496" y="7044532"/>
+            <a:ext cx="287337" cy="0"/>
           </a:xfrm>
           <a:prstGeom prst="line">
             <a:avLst/>
@@ -11262,8 +11262,8 @@
         </p:nvSpPr>
         <p:spPr>
           <a:xfrm>
-            <a:off x="7692526" y="159696"/>
-            <a:ext cx="98166" cy="163568"/>
+            <a:off x="8465785" y="175740"/>
+            <a:ext cx="108034" cy="180000"/>
           </a:xfrm>
           <a:prstGeom prst="rect">
             <a:avLst/>
@@ -11306,8 +11306,8 @@
         </p:nvSpPr>
         <p:spPr bwMode="auto">
           <a:xfrm>
-            <a:off x="6854032" y="602997"/>
-            <a:ext cx="1963861" cy="164454"/>
+            <a:off x="7543005" y="663576"/>
+            <a:ext cx="2161270" cy="180975"/>
           </a:xfrm>
           <a:prstGeom prst="rect">
             <a:avLst/>
@@ -11360,8 +11360,8 @@
         </p:nvSpPr>
         <p:spPr bwMode="auto">
           <a:xfrm>
-            <a:off x="324146" y="6074047"/>
-            <a:ext cx="3755232" cy="451296"/>
+            <a:off x="356729" y="6684264"/>
+            <a:ext cx="4132711" cy="496634"/>
           </a:xfrm>
           <a:prstGeom prst="rect">
             <a:avLst/>
@@ -11430,8 +11430,8 @@
         </p:blipFill>
         <p:spPr bwMode="auto">
           <a:xfrm>
-            <a:off x="1444" y="4499392"/>
-            <a:ext cx="9152657" cy="983836"/>
+            <a:off x="1589" y="4951414"/>
+            <a:ext cx="10072690" cy="1082675"/>
           </a:xfrm>
           <a:prstGeom prst="rect">
             <a:avLst/>
@@ -11457,8 +11457,8 @@
         </p:nvSpPr>
         <p:spPr>
           <a:xfrm>
-            <a:off x="7756762" y="314474"/>
-            <a:ext cx="1094880" cy="184666"/>
+            <a:off x="8573618" y="355600"/>
+            <a:ext cx="1130657" cy="184150"/>
           </a:xfrm>
           <a:prstGeom prst="rect">
             <a:avLst/>
@@ -11523,8 +11523,8 @@
         </p:nvSpPr>
         <p:spPr>
           <a:xfrm>
-            <a:off x="7101762" y="314474"/>
-            <a:ext cx="605515" cy="184666"/>
+            <a:off x="7846314" y="355600"/>
+            <a:ext cx="605028" cy="184150"/>
           </a:xfrm>
           <a:prstGeom prst="rect">
             <a:avLst/>
@@ -11592,8 +11592,8 @@
         </p:nvSpPr>
         <p:spPr>
           <a:xfrm>
-            <a:off x="326109" y="1146848"/>
-            <a:ext cx="8500443" cy="654270"/>
+            <a:off x="358889" y="1262064"/>
+            <a:ext cx="9354915" cy="720000"/>
           </a:xfrm>
           <a:prstGeom prst="rect">
             <a:avLst/>
@@ -11685,8 +11685,8 @@
         </p:nvSpPr>
         <p:spPr>
           <a:xfrm>
-            <a:off x="326108" y="1942034"/>
-            <a:ext cx="8499721" cy="327135"/>
+            <a:off x="358889" y="2137136"/>
+            <a:ext cx="9354120" cy="360000"/>
           </a:xfrm>
           <a:prstGeom prst="rect">
             <a:avLst/>
@@ -11784,8 +11784,8 @@
         </p:nvSpPr>
         <p:spPr>
           <a:xfrm>
-            <a:off x="326109" y="2534421"/>
-            <a:ext cx="8500443" cy="261708"/>
+            <a:off x="358889" y="2789036"/>
+            <a:ext cx="9354915" cy="288000"/>
           </a:xfrm>
           <a:prstGeom prst="rect">
             <a:avLst/>
@@ -11877,8 +11877,8 @@
         </p:nvSpPr>
         <p:spPr>
           <a:xfrm>
-            <a:off x="326109" y="2796128"/>
-            <a:ext cx="8500443" cy="228995"/>
+            <a:off x="358889" y="3077036"/>
+            <a:ext cx="9354915" cy="252000"/>
           </a:xfrm>
           <a:prstGeom prst="rect">
             <a:avLst/>
@@ -11975,8 +11975,8 @@
         </p:blipFill>
         <p:spPr>
           <a:xfrm>
-            <a:off x="324145" y="6060718"/>
-            <a:ext cx="1799306" cy="464624"/>
+            <a:off x="356728" y="6669595"/>
+            <a:ext cx="1980174" cy="511302"/>
           </a:xfrm>
           <a:prstGeom prst="rect">
             <a:avLst/>
@@ -12020,8 +12020,8 @@
         </p:nvSpPr>
         <p:spPr>
           <a:xfrm>
-            <a:off x="276489" y="6355257"/>
-            <a:ext cx="1094880" cy="184666"/>
+            <a:off x="358889" y="7002464"/>
+            <a:ext cx="1095721" cy="185737"/>
           </a:xfrm>
           <a:prstGeom prst="rect">
             <a:avLst/>
@@ -12086,8 +12086,8 @@
         </p:nvSpPr>
         <p:spPr>
           <a:xfrm>
-            <a:off x="1419005" y="6355257"/>
-            <a:ext cx="570249" cy="184666"/>
+            <a:off x="1589590" y="7002464"/>
+            <a:ext cx="571680" cy="185737"/>
           </a:xfrm>
           <a:prstGeom prst="rect">
             <a:avLst/>
@@ -12152,8 +12152,8 @@
         </p:nvCxnSpPr>
         <p:spPr>
           <a:xfrm>
-            <a:off x="326108" y="916037"/>
-            <a:ext cx="8490341" cy="1442"/>
+            <a:off x="358888" y="1008064"/>
+            <a:ext cx="9343798" cy="1587"/>
           </a:xfrm>
           <a:prstGeom prst="line">
             <a:avLst/>
@@ -12194,8 +12194,8 @@
         </p:nvSpPr>
         <p:spPr>
           <a:xfrm>
-            <a:off x="326107" y="6531978"/>
-            <a:ext cx="369396" cy="163011"/>
+            <a:off x="358888" y="7188200"/>
+            <a:ext cx="406528" cy="179388"/>
           </a:xfrm>
           <a:prstGeom prst="rect">
             <a:avLst/>
@@ -12243,8 +12243,8 @@
         </p:nvCxnSpPr>
         <p:spPr>
           <a:xfrm>
-            <a:off x="326108" y="916037"/>
-            <a:ext cx="8490341" cy="1442"/>
+            <a:off x="358888" y="1008064"/>
+            <a:ext cx="9343798" cy="1587"/>
           </a:xfrm>
           <a:prstGeom prst="line">
             <a:avLst/>
@@ -12285,8 +12285,8 @@
         </p:nvSpPr>
         <p:spPr>
           <a:xfrm>
-            <a:off x="326107" y="6531978"/>
-            <a:ext cx="369396" cy="163011"/>
+            <a:off x="358888" y="7188200"/>
+            <a:ext cx="406528" cy="179388"/>
           </a:xfrm>
           <a:prstGeom prst="rect">
             <a:avLst/>
@@ -12334,8 +12334,8 @@
         </p:nvSpPr>
         <p:spPr bwMode="auto">
           <a:xfrm>
-            <a:off x="2927914" y="6270270"/>
-            <a:ext cx="5889979" cy="261708"/>
+            <a:off x="3222230" y="6900200"/>
+            <a:ext cx="6482045" cy="288000"/>
           </a:xfrm>
           <a:prstGeom prst="rect">
             <a:avLst/>
@@ -12395,8 +12395,8 @@
         </p:nvSpPr>
         <p:spPr>
           <a:xfrm>
-            <a:off x="7999840" y="6270270"/>
-            <a:ext cx="818053" cy="261708"/>
+            <a:off x="8803991" y="6900200"/>
+            <a:ext cx="900284" cy="288000"/>
           </a:xfrm>
           <a:prstGeom prst="rect">
             <a:avLst/>
@@ -12451,8 +12451,8 @@
         </p:nvSpPr>
         <p:spPr>
           <a:xfrm>
-            <a:off x="7836230" y="6017297"/>
-            <a:ext cx="163611" cy="261708"/>
+            <a:off x="8623934" y="6621812"/>
+            <a:ext cx="180057" cy="288000"/>
           </a:xfrm>
           <a:prstGeom prst="rect">
             <a:avLst/>
@@ -12493,8 +12493,8 @@
         </p:nvCxnSpPr>
         <p:spPr bwMode="auto">
           <a:xfrm rot="16200000" flipH="1">
-            <a:off x="5742271" y="6401426"/>
-            <a:ext cx="261106" cy="0"/>
+            <a:off x="6319496" y="7044532"/>
+            <a:ext cx="287337" cy="0"/>
           </a:xfrm>
           <a:prstGeom prst="line">
             <a:avLst/>
@@ -12522,8 +12522,8 @@
         </p:nvSpPr>
         <p:spPr>
           <a:xfrm>
-            <a:off x="1337749" y="6218430"/>
-            <a:ext cx="98166" cy="163568"/>
+            <a:off x="1472221" y="6843152"/>
+            <a:ext cx="108034" cy="180000"/>
           </a:xfrm>
           <a:prstGeom prst="rect">
             <a:avLst/>
@@ -12566,8 +12566,8 @@
         </p:nvSpPr>
         <p:spPr bwMode="auto">
           <a:xfrm>
-            <a:off x="326107" y="6016981"/>
-            <a:ext cx="2454465" cy="164454"/>
+            <a:off x="358888" y="6621464"/>
+            <a:ext cx="2701190" cy="180975"/>
           </a:xfrm>
           <a:prstGeom prst="rect">
             <a:avLst/>
@@ -12620,8 +12620,8 @@
         </p:nvSpPr>
         <p:spPr bwMode="auto">
           <a:xfrm>
-            <a:off x="4965809" y="324060"/>
-            <a:ext cx="3852085" cy="330210"/>
+            <a:off x="5464976" y="356616"/>
+            <a:ext cx="4239300" cy="363384"/>
           </a:xfrm>
           <a:prstGeom prst="rect">
             <a:avLst/>
@@ -12681,8 +12681,8 @@
         </p:nvSpPr>
         <p:spPr bwMode="auto">
           <a:xfrm>
-            <a:off x="326108" y="6369853"/>
-            <a:ext cx="2454158" cy="163568"/>
+            <a:off x="358889" y="7009788"/>
+            <a:ext cx="2700852" cy="180000"/>
           </a:xfrm>
           <a:prstGeom prst="rect">
             <a:avLst/>
@@ -12750,8 +12750,8 @@
         </p:blipFill>
         <p:spPr>
           <a:xfrm>
-            <a:off x="7591094" y="324061"/>
-            <a:ext cx="1226800" cy="316789"/>
+            <a:off x="8354157" y="356616"/>
+            <a:ext cx="1350119" cy="348615"/>
           </a:xfrm>
           <a:prstGeom prst="rect">
             <a:avLst/>
@@ -12773,8 +12773,8 @@
         </p:nvSpPr>
         <p:spPr>
           <a:xfrm>
-            <a:off x="326107" y="327135"/>
-            <a:ext cx="6855679" cy="327135"/>
+            <a:off x="358888" y="360000"/>
+            <a:ext cx="7544818" cy="360000"/>
           </a:xfrm>
           <a:prstGeom prst="rect">
             <a:avLst/>
@@ -12866,8 +12866,8 @@
         </p:nvSpPr>
         <p:spPr bwMode="auto">
           <a:xfrm>
-            <a:off x="326108" y="6369853"/>
-            <a:ext cx="2454158" cy="163568"/>
+            <a:off x="358889" y="7009788"/>
+            <a:ext cx="2700852" cy="180000"/>
           </a:xfrm>
           <a:prstGeom prst="rect">
             <a:avLst/>
@@ -12927,8 +12927,8 @@
         </p:nvCxnSpPr>
         <p:spPr>
           <a:xfrm>
-            <a:off x="326108" y="916037"/>
-            <a:ext cx="8490341" cy="1442"/>
+            <a:off x="358888" y="1008064"/>
+            <a:ext cx="9343798" cy="1587"/>
           </a:xfrm>
           <a:prstGeom prst="line">
             <a:avLst/>
@@ -12969,8 +12969,8 @@
         </p:nvSpPr>
         <p:spPr>
           <a:xfrm>
-            <a:off x="326107" y="6531978"/>
-            <a:ext cx="369396" cy="163011"/>
+            <a:off x="358888" y="7188200"/>
+            <a:ext cx="406528" cy="179388"/>
           </a:xfrm>
           <a:prstGeom prst="rect">
             <a:avLst/>
@@ -13018,8 +13018,8 @@
         </p:nvSpPr>
         <p:spPr bwMode="auto">
           <a:xfrm>
-            <a:off x="2927914" y="6270270"/>
-            <a:ext cx="5889979" cy="261708"/>
+            <a:off x="3222230" y="6900200"/>
+            <a:ext cx="6482045" cy="288000"/>
           </a:xfrm>
           <a:prstGeom prst="rect">
             <a:avLst/>
@@ -13079,8 +13079,8 @@
         </p:nvSpPr>
         <p:spPr>
           <a:xfrm>
-            <a:off x="7999840" y="6270270"/>
-            <a:ext cx="818053" cy="261708"/>
+            <a:off x="8803991" y="6900200"/>
+            <a:ext cx="900284" cy="288000"/>
           </a:xfrm>
           <a:prstGeom prst="rect">
             <a:avLst/>
@@ -13135,8 +13135,8 @@
         </p:nvSpPr>
         <p:spPr>
           <a:xfrm>
-            <a:off x="7836230" y="6017297"/>
-            <a:ext cx="163611" cy="261708"/>
+            <a:off x="8623934" y="6621812"/>
+            <a:ext cx="180057" cy="288000"/>
           </a:xfrm>
           <a:prstGeom prst="rect">
             <a:avLst/>
@@ -13177,8 +13177,8 @@
         </p:nvCxnSpPr>
         <p:spPr bwMode="auto">
           <a:xfrm rot="16200000" flipH="1">
-            <a:off x="5742271" y="6401426"/>
-            <a:ext cx="261106" cy="0"/>
+            <a:off x="6319496" y="7044532"/>
+            <a:ext cx="287337" cy="0"/>
           </a:xfrm>
           <a:prstGeom prst="line">
             <a:avLst/>
@@ -13206,8 +13206,8 @@
         </p:nvSpPr>
         <p:spPr>
           <a:xfrm>
-            <a:off x="1337749" y="6218430"/>
-            <a:ext cx="98166" cy="163568"/>
+            <a:off x="1472221" y="6843152"/>
+            <a:ext cx="108034" cy="180000"/>
           </a:xfrm>
           <a:prstGeom prst="rect">
             <a:avLst/>
@@ -13250,8 +13250,8 @@
         </p:nvSpPr>
         <p:spPr bwMode="auto">
           <a:xfrm>
-            <a:off x="326107" y="6016981"/>
-            <a:ext cx="2454465" cy="164454"/>
+            <a:off x="358888" y="6621464"/>
+            <a:ext cx="2701190" cy="180975"/>
           </a:xfrm>
           <a:prstGeom prst="rect">
             <a:avLst/>
@@ -13304,8 +13304,8 @@
         </p:nvSpPr>
         <p:spPr bwMode="auto">
           <a:xfrm>
-            <a:off x="4965809" y="324060"/>
-            <a:ext cx="3852085" cy="330210"/>
+            <a:off x="5464976" y="356616"/>
+            <a:ext cx="4239300" cy="363384"/>
           </a:xfrm>
           <a:prstGeom prst="rect">
             <a:avLst/>
@@ -13365,8 +13365,8 @@
         </p:nvSpPr>
         <p:spPr>
           <a:xfrm>
-            <a:off x="276489" y="6355257"/>
-            <a:ext cx="1094880" cy="184666"/>
+            <a:off x="358889" y="7002464"/>
+            <a:ext cx="1095721" cy="185737"/>
           </a:xfrm>
           <a:prstGeom prst="rect">
             <a:avLst/>
@@ -13431,8 +13431,8 @@
         </p:nvSpPr>
         <p:spPr>
           <a:xfrm>
-            <a:off x="1419005" y="6355257"/>
-            <a:ext cx="570249" cy="184666"/>
+            <a:off x="1589590" y="7002464"/>
+            <a:ext cx="571680" cy="185737"/>
           </a:xfrm>
           <a:prstGeom prst="rect">
             <a:avLst/>
@@ -13500,8 +13500,8 @@
         </p:nvSpPr>
         <p:spPr>
           <a:xfrm>
-            <a:off x="326108" y="1243113"/>
-            <a:ext cx="8490670" cy="4786849"/>
+            <a:off x="358889" y="1368000"/>
+            <a:ext cx="9344160" cy="5267750"/>
           </a:xfrm>
           <a:prstGeom prst="rect">
             <a:avLst/>
@@ -13728,8 +13728,8 @@
         </p:blipFill>
         <p:spPr>
           <a:xfrm>
-            <a:off x="7591094" y="324061"/>
-            <a:ext cx="1226800" cy="316789"/>
+            <a:off x="8354157" y="356616"/>
+            <a:ext cx="1350119" cy="348615"/>
           </a:xfrm>
           <a:prstGeom prst="rect">
             <a:avLst/>
@@ -13751,8 +13751,8 @@
         </p:nvSpPr>
         <p:spPr>
           <a:xfrm>
-            <a:off x="326107" y="327135"/>
-            <a:ext cx="6855679" cy="327135"/>
+            <a:off x="358888" y="360000"/>
+            <a:ext cx="7544818" cy="360000"/>
           </a:xfrm>
           <a:prstGeom prst="rect">
             <a:avLst/>
@@ -13844,8 +13844,8 @@
         </p:nvSpPr>
         <p:spPr bwMode="auto">
           <a:xfrm>
-            <a:off x="326108" y="6369853"/>
-            <a:ext cx="2454158" cy="163568"/>
+            <a:off x="358889" y="7009788"/>
+            <a:ext cx="2700852" cy="180000"/>
           </a:xfrm>
           <a:prstGeom prst="rect">
             <a:avLst/>
@@ -13905,8 +13905,8 @@
         </p:nvCxnSpPr>
         <p:spPr>
           <a:xfrm>
-            <a:off x="326108" y="916037"/>
-            <a:ext cx="8490341" cy="1442"/>
+            <a:off x="358888" y="1008064"/>
+            <a:ext cx="9343798" cy="1587"/>
           </a:xfrm>
           <a:prstGeom prst="line">
             <a:avLst/>
@@ -13947,8 +13947,8 @@
         </p:nvSpPr>
         <p:spPr>
           <a:xfrm>
-            <a:off x="326107" y="6531978"/>
-            <a:ext cx="369396" cy="163011"/>
+            <a:off x="358888" y="7188200"/>
+            <a:ext cx="406528" cy="179388"/>
           </a:xfrm>
           <a:prstGeom prst="rect">
             <a:avLst/>
@@ -13996,8 +13996,8 @@
         </p:nvSpPr>
         <p:spPr bwMode="auto">
           <a:xfrm>
-            <a:off x="2927914" y="6270270"/>
-            <a:ext cx="5889979" cy="261708"/>
+            <a:off x="3222230" y="6900200"/>
+            <a:ext cx="6482045" cy="288000"/>
           </a:xfrm>
           <a:prstGeom prst="rect">
             <a:avLst/>
@@ -14057,8 +14057,8 @@
         </p:nvSpPr>
         <p:spPr>
           <a:xfrm>
-            <a:off x="7999840" y="6270270"/>
-            <a:ext cx="818053" cy="261708"/>
+            <a:off x="8803991" y="6900200"/>
+            <a:ext cx="900284" cy="288000"/>
           </a:xfrm>
           <a:prstGeom prst="rect">
             <a:avLst/>
@@ -14113,8 +14113,8 @@
         </p:nvSpPr>
         <p:spPr>
           <a:xfrm>
-            <a:off x="7836230" y="6017297"/>
-            <a:ext cx="163611" cy="261708"/>
+            <a:off x="8623934" y="6621812"/>
+            <a:ext cx="180057" cy="288000"/>
           </a:xfrm>
           <a:prstGeom prst="rect">
             <a:avLst/>
@@ -14155,8 +14155,8 @@
         </p:nvCxnSpPr>
         <p:spPr bwMode="auto">
           <a:xfrm rot="16200000" flipH="1">
-            <a:off x="5742271" y="6401426"/>
-            <a:ext cx="261106" cy="0"/>
+            <a:off x="6319496" y="7044532"/>
+            <a:ext cx="287337" cy="0"/>
           </a:xfrm>
           <a:prstGeom prst="line">
             <a:avLst/>
@@ -14184,8 +14184,8 @@
         </p:nvSpPr>
         <p:spPr>
           <a:xfrm>
-            <a:off x="1337749" y="6218430"/>
-            <a:ext cx="98166" cy="163568"/>
+            <a:off x="1472221" y="6843152"/>
+            <a:ext cx="108034" cy="180000"/>
           </a:xfrm>
           <a:prstGeom prst="rect">
             <a:avLst/>
@@ -14228,8 +14228,8 @@
         </p:nvSpPr>
         <p:spPr bwMode="auto">
           <a:xfrm>
-            <a:off x="326107" y="6016981"/>
-            <a:ext cx="2454465" cy="164454"/>
+            <a:off x="358888" y="6621464"/>
+            <a:ext cx="2701190" cy="180975"/>
           </a:xfrm>
           <a:prstGeom prst="rect">
             <a:avLst/>
@@ -14282,8 +14282,8 @@
         </p:nvSpPr>
         <p:spPr bwMode="auto">
           <a:xfrm>
-            <a:off x="4965809" y="324060"/>
-            <a:ext cx="3852085" cy="330210"/>
+            <a:off x="5464976" y="356616"/>
+            <a:ext cx="4239300" cy="363384"/>
           </a:xfrm>
           <a:prstGeom prst="rect">
             <a:avLst/>
@@ -14343,8 +14343,8 @@
         </p:nvSpPr>
         <p:spPr>
           <a:xfrm>
-            <a:off x="276489" y="6355257"/>
-            <a:ext cx="1094880" cy="184666"/>
+            <a:off x="358889" y="7002464"/>
+            <a:ext cx="1095721" cy="185737"/>
           </a:xfrm>
           <a:prstGeom prst="rect">
             <a:avLst/>
@@ -14409,8 +14409,8 @@
         </p:nvSpPr>
         <p:spPr>
           <a:xfrm>
-            <a:off x="1419005" y="6355257"/>
-            <a:ext cx="570249" cy="184666"/>
+            <a:off x="1589590" y="7002464"/>
+            <a:ext cx="571680" cy="185737"/>
           </a:xfrm>
           <a:prstGeom prst="rect">
             <a:avLst/>
@@ -14478,8 +14478,8 @@
         </p:nvSpPr>
         <p:spPr>
           <a:xfrm>
-            <a:off x="326108" y="1243113"/>
-            <a:ext cx="8490670" cy="4786849"/>
+            <a:off x="358889" y="1368000"/>
+            <a:ext cx="9344160" cy="5267750"/>
           </a:xfrm>
           <a:prstGeom prst="rect">
             <a:avLst/>
@@ -14704,8 +14704,8 @@
         </p:blipFill>
         <p:spPr>
           <a:xfrm>
-            <a:off x="7591094" y="324061"/>
-            <a:ext cx="1226800" cy="316789"/>
+            <a:off x="8354157" y="356616"/>
+            <a:ext cx="1350119" cy="348615"/>
           </a:xfrm>
           <a:prstGeom prst="rect">
             <a:avLst/>
@@ -14727,8 +14727,8 @@
         </p:nvSpPr>
         <p:spPr>
           <a:xfrm>
-            <a:off x="326107" y="327135"/>
-            <a:ext cx="6855679" cy="327135"/>
+            <a:off x="358888" y="360000"/>
+            <a:ext cx="7544818" cy="360000"/>
           </a:xfrm>
           <a:prstGeom prst="rect">
             <a:avLst/>
@@ -14820,8 +14820,8 @@
         </p:nvSpPr>
         <p:spPr bwMode="auto">
           <a:xfrm>
-            <a:off x="326108" y="6369853"/>
-            <a:ext cx="2454158" cy="163568"/>
+            <a:off x="358889" y="7009788"/>
+            <a:ext cx="2700852" cy="180000"/>
           </a:xfrm>
           <a:prstGeom prst="rect">
             <a:avLst/>
@@ -14881,8 +14881,8 @@
         </p:nvCxnSpPr>
         <p:spPr>
           <a:xfrm>
-            <a:off x="326108" y="916037"/>
-            <a:ext cx="8490341" cy="1442"/>
+            <a:off x="358888" y="1008064"/>
+            <a:ext cx="9343798" cy="1587"/>
           </a:xfrm>
           <a:prstGeom prst="line">
             <a:avLst/>
@@ -14923,8 +14923,8 @@
         </p:nvSpPr>
         <p:spPr>
           <a:xfrm>
-            <a:off x="326107" y="6531978"/>
-            <a:ext cx="369396" cy="163011"/>
+            <a:off x="358888" y="7188200"/>
+            <a:ext cx="406528" cy="179388"/>
           </a:xfrm>
           <a:prstGeom prst="rect">
             <a:avLst/>
@@ -14972,8 +14972,8 @@
         </p:nvSpPr>
         <p:spPr bwMode="auto">
           <a:xfrm>
-            <a:off x="2927914" y="6270270"/>
-            <a:ext cx="5889979" cy="261708"/>
+            <a:off x="3222230" y="6900200"/>
+            <a:ext cx="6482045" cy="288000"/>
           </a:xfrm>
           <a:prstGeom prst="rect">
             <a:avLst/>
@@ -15033,8 +15033,8 @@
         </p:nvSpPr>
         <p:spPr>
           <a:xfrm>
-            <a:off x="7999840" y="6270270"/>
-            <a:ext cx="818053" cy="261708"/>
+            <a:off x="8803991" y="6900200"/>
+            <a:ext cx="900284" cy="288000"/>
           </a:xfrm>
           <a:prstGeom prst="rect">
             <a:avLst/>
@@ -15089,8 +15089,8 @@
         </p:nvSpPr>
         <p:spPr>
           <a:xfrm>
-            <a:off x="7836230" y="6017297"/>
-            <a:ext cx="163611" cy="261708"/>
+            <a:off x="8623934" y="6621812"/>
+            <a:ext cx="180057" cy="288000"/>
           </a:xfrm>
           <a:prstGeom prst="rect">
             <a:avLst/>
@@ -15131,8 +15131,8 @@
         </p:nvCxnSpPr>
         <p:spPr bwMode="auto">
           <a:xfrm rot="16200000" flipH="1">
-            <a:off x="5742271" y="6401426"/>
-            <a:ext cx="261106" cy="0"/>
+            <a:off x="6319496" y="7044532"/>
+            <a:ext cx="287337" cy="0"/>
           </a:xfrm>
           <a:prstGeom prst="line">
             <a:avLst/>
@@ -15160,8 +15160,8 @@
         </p:nvSpPr>
         <p:spPr>
           <a:xfrm>
-            <a:off x="1337749" y="6218430"/>
-            <a:ext cx="98166" cy="163568"/>
+            <a:off x="1472221" y="6843152"/>
+            <a:ext cx="108034" cy="180000"/>
           </a:xfrm>
           <a:prstGeom prst="rect">
             <a:avLst/>
@@ -15204,8 +15204,8 @@
         </p:nvSpPr>
         <p:spPr bwMode="auto">
           <a:xfrm>
-            <a:off x="326107" y="6016981"/>
-            <a:ext cx="2454465" cy="164454"/>
+            <a:off x="358888" y="6621464"/>
+            <a:ext cx="2701190" cy="180975"/>
           </a:xfrm>
           <a:prstGeom prst="rect">
             <a:avLst/>
@@ -15258,8 +15258,8 @@
         </p:nvSpPr>
         <p:spPr bwMode="auto">
           <a:xfrm>
-            <a:off x="4965809" y="324060"/>
-            <a:ext cx="3852085" cy="330210"/>
+            <a:off x="5464976" y="356616"/>
+            <a:ext cx="4239300" cy="363384"/>
           </a:xfrm>
           <a:prstGeom prst="rect">
             <a:avLst/>
@@ -15319,8 +15319,8 @@
         </p:nvSpPr>
         <p:spPr>
           <a:xfrm>
-            <a:off x="276489" y="6355257"/>
-            <a:ext cx="1094880" cy="184666"/>
+            <a:off x="358889" y="7002464"/>
+            <a:ext cx="1095721" cy="185737"/>
           </a:xfrm>
           <a:prstGeom prst="rect">
             <a:avLst/>
@@ -15385,8 +15385,8 @@
         </p:nvSpPr>
         <p:spPr>
           <a:xfrm>
-            <a:off x="1419005" y="6355257"/>
-            <a:ext cx="570249" cy="184666"/>
+            <a:off x="1589590" y="7002464"/>
+            <a:ext cx="571680" cy="185737"/>
           </a:xfrm>
           <a:prstGeom prst="rect">
             <a:avLst/>
@@ -15527,8 +15527,8 @@
         </p:blipFill>
         <p:spPr>
           <a:xfrm>
-            <a:off x="7591094" y="324061"/>
-            <a:ext cx="1226800" cy="316789"/>
+            <a:off x="8354157" y="356616"/>
+            <a:ext cx="1350119" cy="348615"/>
           </a:xfrm>
           <a:prstGeom prst="rect">
             <a:avLst/>
@@ -15550,8 +15550,8 @@
         </p:nvSpPr>
         <p:spPr>
           <a:xfrm>
-            <a:off x="326107" y="327135"/>
-            <a:ext cx="6855679" cy="327135"/>
+            <a:off x="358888" y="360000"/>
+            <a:ext cx="7544818" cy="360000"/>
           </a:xfrm>
           <a:prstGeom prst="rect">
             <a:avLst/>
@@ -15643,8 +15643,8 @@
         </p:nvSpPr>
         <p:spPr bwMode="auto">
           <a:xfrm>
-            <a:off x="326108" y="6369853"/>
-            <a:ext cx="2454158" cy="163568"/>
+            <a:off x="358889" y="7009788"/>
+            <a:ext cx="2700852" cy="180000"/>
           </a:xfrm>
           <a:prstGeom prst="rect">
             <a:avLst/>
@@ -15704,8 +15704,8 @@
         </p:nvCxnSpPr>
         <p:spPr>
           <a:xfrm>
-            <a:off x="326108" y="916037"/>
-            <a:ext cx="8490341" cy="1442"/>
+            <a:off x="358888" y="1008064"/>
+            <a:ext cx="9343798" cy="1587"/>
           </a:xfrm>
           <a:prstGeom prst="line">
             <a:avLst/>
@@ -15746,8 +15746,8 @@
         </p:nvSpPr>
         <p:spPr>
           <a:xfrm>
-            <a:off x="326107" y="6531978"/>
-            <a:ext cx="369396" cy="163011"/>
+            <a:off x="358888" y="7188200"/>
+            <a:ext cx="406528" cy="179388"/>
           </a:xfrm>
           <a:prstGeom prst="rect">
             <a:avLst/>
@@ -15795,8 +15795,8 @@
         </p:nvSpPr>
         <p:spPr bwMode="auto">
           <a:xfrm>
-            <a:off x="2927914" y="6270270"/>
-            <a:ext cx="5889979" cy="261708"/>
+            <a:off x="3222230" y="6900200"/>
+            <a:ext cx="6482045" cy="288000"/>
           </a:xfrm>
           <a:prstGeom prst="rect">
             <a:avLst/>
@@ -15856,8 +15856,8 @@
         </p:nvSpPr>
         <p:spPr>
           <a:xfrm>
-            <a:off x="7999840" y="6270270"/>
-            <a:ext cx="818053" cy="261708"/>
+            <a:off x="8803991" y="6900200"/>
+            <a:ext cx="900284" cy="288000"/>
           </a:xfrm>
           <a:prstGeom prst="rect">
             <a:avLst/>
@@ -15912,8 +15912,8 @@
         </p:nvSpPr>
         <p:spPr>
           <a:xfrm>
-            <a:off x="7836230" y="6017297"/>
-            <a:ext cx="163611" cy="261708"/>
+            <a:off x="8623934" y="6621812"/>
+            <a:ext cx="180057" cy="288000"/>
           </a:xfrm>
           <a:prstGeom prst="rect">
             <a:avLst/>
@@ -15954,8 +15954,8 @@
         </p:nvCxnSpPr>
         <p:spPr bwMode="auto">
           <a:xfrm rot="16200000" flipH="1">
-            <a:off x="5742271" y="6401426"/>
-            <a:ext cx="261106" cy="0"/>
+            <a:off x="6319496" y="7044532"/>
+            <a:ext cx="287337" cy="0"/>
           </a:xfrm>
           <a:prstGeom prst="line">
             <a:avLst/>
@@ -15983,8 +15983,8 @@
         </p:nvSpPr>
         <p:spPr>
           <a:xfrm>
-            <a:off x="1337749" y="6218430"/>
-            <a:ext cx="98166" cy="163568"/>
+            <a:off x="1472221" y="6843152"/>
+            <a:ext cx="108034" cy="180000"/>
           </a:xfrm>
           <a:prstGeom prst="rect">
             <a:avLst/>
@@ -16027,8 +16027,8 @@
         </p:nvSpPr>
         <p:spPr bwMode="auto">
           <a:xfrm>
-            <a:off x="326107" y="6016981"/>
-            <a:ext cx="2454465" cy="164454"/>
+            <a:off x="358888" y="6621464"/>
+            <a:ext cx="2701190" cy="180975"/>
           </a:xfrm>
           <a:prstGeom prst="rect">
             <a:avLst/>
@@ -16081,8 +16081,8 @@
         </p:nvSpPr>
         <p:spPr bwMode="auto">
           <a:xfrm>
-            <a:off x="4965809" y="324060"/>
-            <a:ext cx="3852085" cy="330210"/>
+            <a:off x="5464976" y="356616"/>
+            <a:ext cx="4239300" cy="363384"/>
           </a:xfrm>
           <a:prstGeom prst="rect">
             <a:avLst/>
@@ -16142,8 +16142,8 @@
         </p:nvSpPr>
         <p:spPr>
           <a:xfrm>
-            <a:off x="276489" y="6355257"/>
-            <a:ext cx="1094880" cy="184666"/>
+            <a:off x="358889" y="7002464"/>
+            <a:ext cx="1095721" cy="185737"/>
           </a:xfrm>
           <a:prstGeom prst="rect">
             <a:avLst/>
@@ -16208,8 +16208,8 @@
         </p:nvSpPr>
         <p:spPr>
           <a:xfrm>
-            <a:off x="1419005" y="6355257"/>
-            <a:ext cx="570249" cy="184666"/>
+            <a:off x="1589590" y="7002464"/>
+            <a:ext cx="571680" cy="185737"/>
           </a:xfrm>
           <a:prstGeom prst="rect">
             <a:avLst/>
@@ -16277,8 +16277,8 @@
         </p:nvSpPr>
         <p:spPr>
           <a:xfrm>
-            <a:off x="326108" y="1243500"/>
-            <a:ext cx="8491785" cy="1092607"/>
+            <a:off x="358888" y="1368425"/>
+            <a:ext cx="9345387" cy="1092607"/>
           </a:xfrm>
         </p:spPr>
         <p:txBody>
@@ -16388,8 +16388,8 @@
         </p:blipFill>
         <p:spPr>
           <a:xfrm>
-            <a:off x="7591094" y="324061"/>
-            <a:ext cx="1226800" cy="316789"/>
+            <a:off x="8354157" y="356616"/>
+            <a:ext cx="1350119" cy="348615"/>
           </a:xfrm>
           <a:prstGeom prst="rect">
             <a:avLst/>
@@ -16411,8 +16411,8 @@
         </p:nvSpPr>
         <p:spPr>
           <a:xfrm>
-            <a:off x="326107" y="327135"/>
-            <a:ext cx="6855679" cy="327135"/>
+            <a:off x="358888" y="360000"/>
+            <a:ext cx="7544818" cy="360000"/>
           </a:xfrm>
           <a:prstGeom prst="rect">
             <a:avLst/>
@@ -16504,8 +16504,8 @@
         </p:nvSpPr>
         <p:spPr bwMode="auto">
           <a:xfrm>
-            <a:off x="326108" y="6369853"/>
-            <a:ext cx="2454158" cy="163568"/>
+            <a:off x="358889" y="7009788"/>
+            <a:ext cx="2700852" cy="180000"/>
           </a:xfrm>
           <a:prstGeom prst="rect">
             <a:avLst/>
@@ -16565,8 +16565,8 @@
         </p:nvCxnSpPr>
         <p:spPr>
           <a:xfrm>
-            <a:off x="335999" y="916037"/>
-            <a:ext cx="8490341" cy="1442"/>
+            <a:off x="358888" y="1008064"/>
+            <a:ext cx="9343798" cy="1587"/>
           </a:xfrm>
           <a:prstGeom prst="line">
             <a:avLst/>
@@ -16607,8 +16607,8 @@
         </p:nvSpPr>
         <p:spPr>
           <a:xfrm>
-            <a:off x="326107" y="6531978"/>
-            <a:ext cx="369396" cy="163011"/>
+            <a:off x="358888" y="7188200"/>
+            <a:ext cx="406528" cy="179388"/>
           </a:xfrm>
           <a:prstGeom prst="rect">
             <a:avLst/>
@@ -16656,8 +16656,8 @@
         </p:nvSpPr>
         <p:spPr bwMode="auto">
           <a:xfrm>
-            <a:off x="2927914" y="6270270"/>
-            <a:ext cx="5889979" cy="261708"/>
+            <a:off x="3222230" y="6900200"/>
+            <a:ext cx="6482045" cy="288000"/>
           </a:xfrm>
           <a:prstGeom prst="rect">
             <a:avLst/>
@@ -16717,8 +16717,8 @@
         </p:nvSpPr>
         <p:spPr>
           <a:xfrm>
-            <a:off x="7999840" y="6270270"/>
-            <a:ext cx="818053" cy="261708"/>
+            <a:off x="8803991" y="6900200"/>
+            <a:ext cx="900284" cy="288000"/>
           </a:xfrm>
           <a:prstGeom prst="rect">
             <a:avLst/>
@@ -16773,8 +16773,8 @@
         </p:nvSpPr>
         <p:spPr>
           <a:xfrm>
-            <a:off x="7836230" y="6017297"/>
-            <a:ext cx="163611" cy="261708"/>
+            <a:off x="8623934" y="6621812"/>
+            <a:ext cx="180057" cy="288000"/>
           </a:xfrm>
           <a:prstGeom prst="rect">
             <a:avLst/>
@@ -16815,8 +16815,8 @@
         </p:nvCxnSpPr>
         <p:spPr bwMode="auto">
           <a:xfrm rot="16200000" flipH="1">
-            <a:off x="5742271" y="6401426"/>
-            <a:ext cx="261106" cy="0"/>
+            <a:off x="6319496" y="7044532"/>
+            <a:ext cx="287337" cy="0"/>
           </a:xfrm>
           <a:prstGeom prst="line">
             <a:avLst/>
@@ -16844,8 +16844,8 @@
         </p:nvSpPr>
         <p:spPr>
           <a:xfrm>
-            <a:off x="1337749" y="6218430"/>
-            <a:ext cx="98166" cy="163568"/>
+            <a:off x="1472221" y="6843152"/>
+            <a:ext cx="108034" cy="180000"/>
           </a:xfrm>
           <a:prstGeom prst="rect">
             <a:avLst/>
@@ -16888,8 +16888,8 @@
         </p:nvSpPr>
         <p:spPr bwMode="auto">
           <a:xfrm>
-            <a:off x="326107" y="6016981"/>
-            <a:ext cx="2454465" cy="164454"/>
+            <a:off x="358888" y="6621464"/>
+            <a:ext cx="2701190" cy="180975"/>
           </a:xfrm>
           <a:prstGeom prst="rect">
             <a:avLst/>
@@ -16942,8 +16942,8 @@
         </p:nvSpPr>
         <p:spPr bwMode="auto">
           <a:xfrm>
-            <a:off x="4965809" y="324060"/>
-            <a:ext cx="3852085" cy="330210"/>
+            <a:off x="5464976" y="356616"/>
+            <a:ext cx="4239300" cy="363384"/>
           </a:xfrm>
           <a:prstGeom prst="rect">
             <a:avLst/>
@@ -17003,8 +17003,8 @@
         </p:nvSpPr>
         <p:spPr>
           <a:xfrm>
-            <a:off x="276489" y="6355257"/>
-            <a:ext cx="1094880" cy="184666"/>
+            <a:off x="358889" y="7002464"/>
+            <a:ext cx="1095721" cy="185737"/>
           </a:xfrm>
           <a:prstGeom prst="rect">
             <a:avLst/>
@@ -17069,8 +17069,8 @@
         </p:nvSpPr>
         <p:spPr>
           <a:xfrm>
-            <a:off x="1419005" y="6355257"/>
-            <a:ext cx="570249" cy="184666"/>
+            <a:off x="1589590" y="7002464"/>
+            <a:ext cx="571680" cy="185737"/>
           </a:xfrm>
           <a:prstGeom prst="rect">
             <a:avLst/>
@@ -17138,8 +17138,8 @@
         </p:nvSpPr>
         <p:spPr>
           <a:xfrm>
-            <a:off x="4730003" y="1243501"/>
-            <a:ext cx="4080674" cy="4786463"/>
+            <a:off x="5205467" y="1368426"/>
+            <a:ext cx="4490867" cy="5267325"/>
           </a:xfrm>
         </p:spPr>
         <p:txBody>
@@ -17198,8 +17198,8 @@
         </p:nvSpPr>
         <p:spPr>
           <a:xfrm>
-            <a:off x="326108" y="1243501"/>
-            <a:ext cx="4080674" cy="4786463"/>
+            <a:off x="358888" y="1368426"/>
+            <a:ext cx="4490867" cy="5267325"/>
           </a:xfrm>
         </p:spPr>
         <p:txBody>
@@ -17267,8 +17267,8 @@
         </p:blipFill>
         <p:spPr>
           <a:xfrm>
-            <a:off x="7600986" y="324061"/>
-            <a:ext cx="1226800" cy="316789"/>
+            <a:off x="8354157" y="356616"/>
+            <a:ext cx="1350119" cy="348615"/>
           </a:xfrm>
           <a:prstGeom prst="rect">
             <a:avLst/>
@@ -17290,8 +17290,8 @@
         </p:nvSpPr>
         <p:spPr>
           <a:xfrm>
-            <a:off x="326107" y="327135"/>
-            <a:ext cx="6855679" cy="327135"/>
+            <a:off x="358888" y="360000"/>
+            <a:ext cx="7544818" cy="360000"/>
           </a:xfrm>
           <a:prstGeom prst="rect">
             <a:avLst/>
@@ -17383,8 +17383,8 @@
         </p:nvSpPr>
         <p:spPr bwMode="auto">
           <a:xfrm>
-            <a:off x="326108" y="6369853"/>
-            <a:ext cx="2454158" cy="163568"/>
+            <a:off x="358889" y="7009788"/>
+            <a:ext cx="2700852" cy="180000"/>
           </a:xfrm>
           <a:prstGeom prst="rect">
             <a:avLst/>
@@ -17444,8 +17444,8 @@
         </p:nvCxnSpPr>
         <p:spPr>
           <a:xfrm>
-            <a:off x="326108" y="916037"/>
-            <a:ext cx="8490341" cy="1442"/>
+            <a:off x="358888" y="1008064"/>
+            <a:ext cx="9343798" cy="1587"/>
           </a:xfrm>
           <a:prstGeom prst="line">
             <a:avLst/>
@@ -17486,8 +17486,8 @@
         </p:nvSpPr>
         <p:spPr>
           <a:xfrm>
-            <a:off x="326107" y="6531978"/>
-            <a:ext cx="369396" cy="163011"/>
+            <a:off x="358888" y="7188200"/>
+            <a:ext cx="406528" cy="179388"/>
           </a:xfrm>
           <a:prstGeom prst="rect">
             <a:avLst/>
@@ -17535,8 +17535,8 @@
         </p:nvSpPr>
         <p:spPr bwMode="auto">
           <a:xfrm>
-            <a:off x="2927914" y="6270270"/>
-            <a:ext cx="5889979" cy="261708"/>
+            <a:off x="3222230" y="6900200"/>
+            <a:ext cx="6482045" cy="288000"/>
           </a:xfrm>
           <a:prstGeom prst="rect">
             <a:avLst/>
@@ -17596,8 +17596,8 @@
         </p:nvSpPr>
         <p:spPr>
           <a:xfrm>
-            <a:off x="7999840" y="6270270"/>
-            <a:ext cx="818053" cy="261708"/>
+            <a:off x="8803991" y="6900200"/>
+            <a:ext cx="900284" cy="288000"/>
           </a:xfrm>
           <a:prstGeom prst="rect">
             <a:avLst/>
@@ -17652,8 +17652,8 @@
         </p:nvSpPr>
         <p:spPr>
           <a:xfrm>
-            <a:off x="7836230" y="6017297"/>
-            <a:ext cx="163611" cy="261708"/>
+            <a:off x="8623934" y="6621812"/>
+            <a:ext cx="180057" cy="288000"/>
           </a:xfrm>
           <a:prstGeom prst="rect">
             <a:avLst/>
@@ -17694,8 +17694,8 @@
         </p:nvCxnSpPr>
         <p:spPr bwMode="auto">
           <a:xfrm rot="16200000" flipH="1">
-            <a:off x="5742271" y="6401426"/>
-            <a:ext cx="261106" cy="0"/>
+            <a:off x="6319496" y="7044532"/>
+            <a:ext cx="287337" cy="0"/>
           </a:xfrm>
           <a:prstGeom prst="line">
             <a:avLst/>
@@ -17723,8 +17723,8 @@
         </p:nvSpPr>
         <p:spPr>
           <a:xfrm>
-            <a:off x="1337749" y="6218430"/>
-            <a:ext cx="98166" cy="163568"/>
+            <a:off x="1472221" y="6843152"/>
+            <a:ext cx="108034" cy="180000"/>
           </a:xfrm>
           <a:prstGeom prst="rect">
             <a:avLst/>
@@ -17767,8 +17767,8 @@
         </p:nvSpPr>
         <p:spPr bwMode="auto">
           <a:xfrm>
-            <a:off x="326107" y="6016981"/>
-            <a:ext cx="2454465" cy="164454"/>
+            <a:off x="358888" y="6621464"/>
+            <a:ext cx="2701190" cy="180975"/>
           </a:xfrm>
           <a:prstGeom prst="rect">
             <a:avLst/>
@@ -17821,8 +17821,8 @@
         </p:nvSpPr>
         <p:spPr bwMode="auto">
           <a:xfrm>
-            <a:off x="4965809" y="324060"/>
-            <a:ext cx="3852085" cy="330210"/>
+            <a:off x="5464976" y="356616"/>
+            <a:ext cx="4239300" cy="363384"/>
           </a:xfrm>
           <a:prstGeom prst="rect">
             <a:avLst/>
@@ -17882,8 +17882,8 @@
         </p:nvSpPr>
         <p:spPr>
           <a:xfrm>
-            <a:off x="276489" y="6355257"/>
-            <a:ext cx="1094880" cy="184666"/>
+            <a:off x="358889" y="7002464"/>
+            <a:ext cx="1095721" cy="185737"/>
           </a:xfrm>
           <a:prstGeom prst="rect">
             <a:avLst/>
@@ -17948,8 +17948,8 @@
         </p:nvSpPr>
         <p:spPr>
           <a:xfrm>
-            <a:off x="1419005" y="6355257"/>
-            <a:ext cx="570249" cy="184666"/>
+            <a:off x="1589590" y="7002464"/>
+            <a:ext cx="571680" cy="185737"/>
           </a:xfrm>
           <a:prstGeom prst="rect">
             <a:avLst/>
@@ -18017,8 +18017,8 @@
         </p:nvSpPr>
         <p:spPr>
           <a:xfrm>
-            <a:off x="326108" y="1243501"/>
-            <a:ext cx="4080674" cy="4786463"/>
+            <a:off x="358888" y="1368426"/>
+            <a:ext cx="4490867" cy="5267325"/>
           </a:xfrm>
         </p:spPr>
         <p:txBody>
@@ -18082,8 +18082,8 @@
         </p:blipFill>
         <p:spPr>
           <a:xfrm>
-            <a:off x="7591094" y="324061"/>
-            <a:ext cx="1226800" cy="316789"/>
+            <a:off x="8354157" y="356616"/>
+            <a:ext cx="1350119" cy="348615"/>
           </a:xfrm>
           <a:prstGeom prst="rect">
             <a:avLst/>
@@ -18105,8 +18105,8 @@
         </p:nvSpPr>
         <p:spPr>
           <a:xfrm>
-            <a:off x="326107" y="327135"/>
-            <a:ext cx="6855679" cy="327135"/>
+            <a:off x="358888" y="360000"/>
+            <a:ext cx="7544818" cy="360000"/>
           </a:xfrm>
           <a:prstGeom prst="rect">
             <a:avLst/>
@@ -18198,8 +18198,8 @@
         </p:nvSpPr>
         <p:spPr bwMode="auto">
           <a:xfrm>
-            <a:off x="326108" y="6369853"/>
-            <a:ext cx="2454158" cy="163568"/>
+            <a:off x="358889" y="7009788"/>
+            <a:ext cx="2700852" cy="180000"/>
           </a:xfrm>
           <a:prstGeom prst="rect">
             <a:avLst/>
@@ -18259,8 +18259,8 @@
         </p:nvCxnSpPr>
         <p:spPr>
           <a:xfrm>
-            <a:off x="326108" y="916037"/>
-            <a:ext cx="8490341" cy="1442"/>
+            <a:off x="358888" y="1008064"/>
+            <a:ext cx="9343798" cy="1587"/>
           </a:xfrm>
           <a:prstGeom prst="line">
             <a:avLst/>
@@ -18301,8 +18301,8 @@
         </p:nvSpPr>
         <p:spPr>
           <a:xfrm>
-            <a:off x="326107" y="6531978"/>
-            <a:ext cx="369396" cy="163011"/>
+            <a:off x="358888" y="7188200"/>
+            <a:ext cx="406528" cy="179388"/>
           </a:xfrm>
           <a:prstGeom prst="rect">
             <a:avLst/>
@@ -18350,8 +18350,8 @@
         </p:nvSpPr>
         <p:spPr bwMode="auto">
           <a:xfrm>
-            <a:off x="2927914" y="6270270"/>
-            <a:ext cx="5889979" cy="261708"/>
+            <a:off x="3222230" y="6900200"/>
+            <a:ext cx="6482045" cy="288000"/>
           </a:xfrm>
           <a:prstGeom prst="rect">
             <a:avLst/>
@@ -18411,8 +18411,8 @@
         </p:nvSpPr>
         <p:spPr>
           <a:xfrm>
-            <a:off x="7999840" y="6270270"/>
-            <a:ext cx="818053" cy="261708"/>
+            <a:off x="8803991" y="6900200"/>
+            <a:ext cx="900284" cy="288000"/>
           </a:xfrm>
           <a:prstGeom prst="rect">
             <a:avLst/>
@@ -18467,8 +18467,8 @@
         </p:nvSpPr>
         <p:spPr>
           <a:xfrm>
-            <a:off x="7836230" y="6017297"/>
-            <a:ext cx="163611" cy="261708"/>
+            <a:off x="8623934" y="6621812"/>
+            <a:ext cx="180057" cy="288000"/>
           </a:xfrm>
           <a:prstGeom prst="rect">
             <a:avLst/>
@@ -18509,8 +18509,8 @@
         </p:nvCxnSpPr>
         <p:spPr bwMode="auto">
           <a:xfrm rot="16200000" flipH="1">
-            <a:off x="5742271" y="6401426"/>
-            <a:ext cx="261106" cy="0"/>
+            <a:off x="6319496" y="7044532"/>
+            <a:ext cx="287337" cy="0"/>
           </a:xfrm>
           <a:prstGeom prst="line">
             <a:avLst/>
@@ -18538,8 +18538,8 @@
         </p:nvSpPr>
         <p:spPr>
           <a:xfrm>
-            <a:off x="1337749" y="6218430"/>
-            <a:ext cx="98166" cy="163568"/>
+            <a:off x="1472221" y="6843152"/>
+            <a:ext cx="108034" cy="180000"/>
           </a:xfrm>
           <a:prstGeom prst="rect">
             <a:avLst/>
@@ -18582,8 +18582,8 @@
         </p:nvSpPr>
         <p:spPr bwMode="auto">
           <a:xfrm>
-            <a:off x="326107" y="6016981"/>
-            <a:ext cx="2454465" cy="164454"/>
+            <a:off x="358888" y="6621464"/>
+            <a:ext cx="2701190" cy="180975"/>
           </a:xfrm>
           <a:prstGeom prst="rect">
             <a:avLst/>
@@ -18636,8 +18636,8 @@
         </p:nvSpPr>
         <p:spPr bwMode="auto">
           <a:xfrm>
-            <a:off x="4965809" y="324060"/>
-            <a:ext cx="3852085" cy="330210"/>
+            <a:off x="5464976" y="356616"/>
+            <a:ext cx="4239300" cy="363384"/>
           </a:xfrm>
           <a:prstGeom prst="rect">
             <a:avLst/>
@@ -18697,8 +18697,8 @@
         </p:nvSpPr>
         <p:spPr>
           <a:xfrm>
-            <a:off x="276489" y="6355257"/>
-            <a:ext cx="1094880" cy="184666"/>
+            <a:off x="358889" y="7002464"/>
+            <a:ext cx="1095721" cy="185737"/>
           </a:xfrm>
           <a:prstGeom prst="rect">
             <a:avLst/>
@@ -18763,8 +18763,8 @@
         </p:nvSpPr>
         <p:spPr>
           <a:xfrm>
-            <a:off x="1419005" y="6355257"/>
-            <a:ext cx="570249" cy="184666"/>
+            <a:off x="1589590" y="7002464"/>
+            <a:ext cx="571680" cy="185737"/>
           </a:xfrm>
           <a:prstGeom prst="rect">
             <a:avLst/>
@@ -18832,8 +18832,8 @@
         </p:nvSpPr>
         <p:spPr>
           <a:xfrm>
-            <a:off x="6206146" y="1243501"/>
-            <a:ext cx="2611747" cy="4786463"/>
+            <a:off x="6829993" y="1368426"/>
+            <a:ext cx="2874282" cy="5267325"/>
           </a:xfrm>
         </p:spPr>
         <p:txBody>
@@ -18892,8 +18892,8 @@
         </p:nvSpPr>
         <p:spPr>
           <a:xfrm>
-            <a:off x="3265405" y="1243501"/>
-            <a:ext cx="2611747" cy="4786463"/>
+            <a:off x="3593647" y="1368426"/>
+            <a:ext cx="2874282" cy="5267325"/>
           </a:xfrm>
         </p:spPr>
         <p:txBody>
@@ -18952,8 +18952,8 @@
         </p:nvSpPr>
         <p:spPr>
           <a:xfrm>
-            <a:off x="327551" y="1243501"/>
-            <a:ext cx="2611747" cy="4786463"/>
+            <a:off x="360477" y="1368426"/>
+            <a:ext cx="2874282" cy="5267325"/>
           </a:xfrm>
         </p:spPr>
         <p:txBody>
@@ -19017,8 +19017,8 @@
         </p:blipFill>
         <p:spPr>
           <a:xfrm>
-            <a:off x="7591094" y="324061"/>
-            <a:ext cx="1226800" cy="316789"/>
+            <a:off x="8354157" y="356616"/>
+            <a:ext cx="1350119" cy="348615"/>
           </a:xfrm>
           <a:prstGeom prst="rect">
             <a:avLst/>
@@ -19040,8 +19040,8 @@
         </p:nvSpPr>
         <p:spPr>
           <a:xfrm>
-            <a:off x="326107" y="327135"/>
-            <a:ext cx="6855679" cy="327135"/>
+            <a:off x="358888" y="360000"/>
+            <a:ext cx="7544818" cy="360000"/>
           </a:xfrm>
           <a:prstGeom prst="rect">
             <a:avLst/>
@@ -19133,8 +19133,8 @@
         </p:nvSpPr>
         <p:spPr bwMode="auto">
           <a:xfrm>
-            <a:off x="326108" y="6369853"/>
-            <a:ext cx="2454158" cy="163568"/>
+            <a:off x="358889" y="7009788"/>
+            <a:ext cx="2700852" cy="180000"/>
           </a:xfrm>
           <a:prstGeom prst="rect">
             <a:avLst/>
@@ -19194,8 +19194,8 @@
         </p:nvCxnSpPr>
         <p:spPr>
           <a:xfrm>
-            <a:off x="326108" y="916037"/>
-            <a:ext cx="8490341" cy="1442"/>
+            <a:off x="358888" y="1008064"/>
+            <a:ext cx="9343798" cy="1587"/>
           </a:xfrm>
           <a:prstGeom prst="line">
             <a:avLst/>
@@ -19236,8 +19236,8 @@
         </p:nvSpPr>
         <p:spPr>
           <a:xfrm>
-            <a:off x="326107" y="6531978"/>
-            <a:ext cx="369396" cy="163011"/>
+            <a:off x="358888" y="7188200"/>
+            <a:ext cx="406528" cy="179388"/>
           </a:xfrm>
           <a:prstGeom prst="rect">
             <a:avLst/>
@@ -19285,8 +19285,8 @@
         </p:nvSpPr>
         <p:spPr bwMode="auto">
           <a:xfrm>
-            <a:off x="2927914" y="6270270"/>
-            <a:ext cx="5889979" cy="261708"/>
+            <a:off x="3222230" y="6900200"/>
+            <a:ext cx="6482045" cy="288000"/>
           </a:xfrm>
           <a:prstGeom prst="rect">
             <a:avLst/>
@@ -19346,8 +19346,8 @@
         </p:nvSpPr>
         <p:spPr>
           <a:xfrm>
-            <a:off x="7999840" y="6270270"/>
-            <a:ext cx="818053" cy="261708"/>
+            <a:off x="8803991" y="6900200"/>
+            <a:ext cx="900284" cy="288000"/>
           </a:xfrm>
           <a:prstGeom prst="rect">
             <a:avLst/>
@@ -19402,8 +19402,8 @@
         </p:nvSpPr>
         <p:spPr>
           <a:xfrm>
-            <a:off x="7836230" y="6017297"/>
-            <a:ext cx="163611" cy="261708"/>
+            <a:off x="8623934" y="6621812"/>
+            <a:ext cx="180057" cy="288000"/>
           </a:xfrm>
           <a:prstGeom prst="rect">
             <a:avLst/>
@@ -19444,8 +19444,8 @@
         </p:nvCxnSpPr>
         <p:spPr bwMode="auto">
           <a:xfrm rot="16200000" flipH="1">
-            <a:off x="5742271" y="6401426"/>
-            <a:ext cx="261106" cy="0"/>
+            <a:off x="6319496" y="7044532"/>
+            <a:ext cx="287337" cy="0"/>
           </a:xfrm>
           <a:prstGeom prst="line">
             <a:avLst/>
@@ -19473,8 +19473,8 @@
         </p:nvSpPr>
         <p:spPr>
           <a:xfrm>
-            <a:off x="1337749" y="6218430"/>
-            <a:ext cx="98166" cy="163568"/>
+            <a:off x="1472221" y="6843152"/>
+            <a:ext cx="108034" cy="180000"/>
           </a:xfrm>
           <a:prstGeom prst="rect">
             <a:avLst/>
@@ -19517,8 +19517,8 @@
         </p:nvSpPr>
         <p:spPr bwMode="auto">
           <a:xfrm>
-            <a:off x="326107" y="6016981"/>
-            <a:ext cx="2454465" cy="164454"/>
+            <a:off x="358888" y="6621464"/>
+            <a:ext cx="2701190" cy="180975"/>
           </a:xfrm>
           <a:prstGeom prst="rect">
             <a:avLst/>
@@ -19571,8 +19571,8 @@
         </p:nvSpPr>
         <p:spPr bwMode="auto">
           <a:xfrm>
-            <a:off x="4965809" y="324060"/>
-            <a:ext cx="3852085" cy="330210"/>
+            <a:off x="5464976" y="356616"/>
+            <a:ext cx="4239300" cy="363384"/>
           </a:xfrm>
           <a:prstGeom prst="rect">
             <a:avLst/>
@@ -19632,8 +19632,8 @@
         </p:nvSpPr>
         <p:spPr>
           <a:xfrm>
-            <a:off x="276489" y="6355257"/>
-            <a:ext cx="1094880" cy="184666"/>
+            <a:off x="358889" y="7002464"/>
+            <a:ext cx="1095721" cy="185737"/>
           </a:xfrm>
           <a:prstGeom prst="rect">
             <a:avLst/>
@@ -19698,8 +19698,8 @@
         </p:nvSpPr>
         <p:spPr>
           <a:xfrm>
-            <a:off x="1419005" y="6355257"/>
-            <a:ext cx="570249" cy="184666"/>
+            <a:off x="1589590" y="7002464"/>
+            <a:ext cx="571680" cy="185737"/>
           </a:xfrm>
           <a:prstGeom prst="rect">
             <a:avLst/>
@@ -19767,8 +19767,8 @@
         </p:nvSpPr>
         <p:spPr>
           <a:xfrm>
-            <a:off x="327551" y="1243501"/>
-            <a:ext cx="2611747" cy="4786463"/>
+            <a:off x="360477" y="1368426"/>
+            <a:ext cx="2874282" cy="5267325"/>
           </a:xfrm>
         </p:spPr>
         <p:txBody>
@@ -19831,8 +19831,8 @@
         </p:blipFill>
         <p:spPr>
           <a:xfrm>
-            <a:off x="7591094" y="324061"/>
-            <a:ext cx="1226800" cy="316789"/>
+            <a:off x="8354157" y="356616"/>
+            <a:ext cx="1350119" cy="348615"/>
           </a:xfrm>
           <a:prstGeom prst="rect">
             <a:avLst/>
@@ -19854,8 +19854,8 @@
         </p:nvSpPr>
         <p:spPr>
           <a:xfrm>
-            <a:off x="326107" y="327135"/>
-            <a:ext cx="6855679" cy="327135"/>
+            <a:off x="358888" y="360000"/>
+            <a:ext cx="7544818" cy="360000"/>
           </a:xfrm>
           <a:prstGeom prst="rect">
             <a:avLst/>
@@ -19955,8 +19955,8 @@
         </p:nvSpPr>
         <p:spPr bwMode="auto">
           <a:xfrm>
-            <a:off x="326109" y="316948"/>
-            <a:ext cx="6501951" cy="326022"/>
+            <a:off x="358889" y="348789"/>
+            <a:ext cx="7155533" cy="358775"/>
           </a:xfrm>
           <a:prstGeom prst="rect">
             <a:avLst/>
@@ -19997,8 +19997,8 @@
         </p:nvSpPr>
         <p:spPr bwMode="auto">
           <a:xfrm>
-            <a:off x="326108" y="1243501"/>
-            <a:ext cx="8491785" cy="4786463"/>
+            <a:off x="358888" y="1368426"/>
+            <a:ext cx="9345387" cy="5267325"/>
           </a:xfrm>
           <a:prstGeom prst="rect">
             <a:avLst/>
@@ -20574,7 +20574,7 @@
         </p:nvSpPr>
         <p:spPr>
           <a:xfrm>
-            <a:off x="-459581" y="1402929"/>
+            <a:off x="0" y="1747416"/>
             <a:ext cx="10063163" cy="1941180"/>
           </a:xfrm>
         </p:spPr>
@@ -20656,7 +20656,7 @@
         </p:blipFill>
         <p:spPr bwMode="auto">
           <a:xfrm>
-            <a:off x="6892354" y="5955574"/>
+            <a:off x="7351935" y="6300061"/>
             <a:ext cx="2214080" cy="1245420"/>
           </a:xfrm>
           <a:prstGeom prst="rect">
@@ -20734,7 +20734,7 @@
         </p:nvSpPr>
         <p:spPr>
           <a:xfrm>
-            <a:off x="-75407" y="1083260"/>
+            <a:off x="384174" y="1427747"/>
             <a:ext cx="6245225" cy="2037348"/>
           </a:xfrm>
           <a:prstGeom prst="rect">
@@ -20949,7 +20949,7 @@
         </p:nvSpPr>
         <p:spPr>
           <a:xfrm>
-            <a:off x="-100693" y="24657"/>
+            <a:off x="358888" y="369144"/>
             <a:ext cx="7544818" cy="360000"/>
           </a:xfrm>
         </p:spPr>
@@ -20986,7 +20986,7 @@
         </p:blipFill>
         <p:spPr>
           <a:xfrm>
-            <a:off x="-100693" y="796591"/>
+            <a:off x="358888" y="1141077"/>
             <a:ext cx="9459847" cy="5945671"/>
           </a:xfrm>
           <a:prstGeom prst="rect">
@@ -21065,7 +21065,7 @@
         </p:nvSpPr>
         <p:spPr>
           <a:xfrm>
-            <a:off x="-100693" y="728220"/>
+            <a:off x="358888" y="1072706"/>
             <a:ext cx="9581525" cy="5191165"/>
           </a:xfrm>
           <a:prstGeom prst="rect">
@@ -21083,6 +21083,7 @@
               <a:spcBef>
                 <a:spcPts val="800"/>
               </a:spcBef>
+              <a:buNone/>
               <a:defRPr/>
             </a:pPr>
             <a:r>
@@ -21127,6 +21128,7 @@
               <a:spcBef>
                 <a:spcPts val="800"/>
               </a:spcBef>
+              <a:buNone/>
               <a:defRPr/>
             </a:pPr>
             <a:r>
@@ -21141,6 +21143,7 @@
               <a:spcBef>
                 <a:spcPts val="800"/>
               </a:spcBef>
+              <a:buNone/>
               <a:defRPr/>
             </a:pPr>
             <a:endParaRPr lang="en-US" sz="1600" u="sng" dirty="0"/>
@@ -21150,6 +21153,7 @@
               <a:spcBef>
                 <a:spcPts val="800"/>
               </a:spcBef>
+              <a:buNone/>
               <a:defRPr/>
             </a:pPr>
             <a:endParaRPr lang="en-US" sz="1600" u="sng" dirty="0"/>
@@ -21159,6 +21163,7 @@
               <a:spcBef>
                 <a:spcPts val="800"/>
               </a:spcBef>
+              <a:buNone/>
               <a:defRPr/>
             </a:pPr>
             <a:endParaRPr lang="en-US" sz="1600" u="sng" dirty="0"/>
@@ -21264,6 +21269,7 @@
               <a:spcBef>
                 <a:spcPts val="800"/>
               </a:spcBef>
+              <a:buNone/>
               <a:defRPr/>
             </a:pPr>
             <a:endParaRPr lang="en-US" sz="1600" dirty="0">
@@ -21275,6 +21281,7 @@
               <a:spcBef>
                 <a:spcPts val="800"/>
               </a:spcBef>
+              <a:buNone/>
               <a:defRPr/>
             </a:pPr>
             <a:endParaRPr lang="en-US" sz="1600" b="1" dirty="0">
@@ -21286,6 +21293,7 @@
               <a:spcBef>
                 <a:spcPts val="800"/>
               </a:spcBef>
+              <a:buNone/>
               <a:defRPr/>
             </a:pPr>
             <a:endParaRPr lang="en-US" sz="1600" dirty="0">
@@ -21297,6 +21305,7 @@
               <a:spcBef>
                 <a:spcPts val="800"/>
               </a:spcBef>
+              <a:buNone/>
               <a:defRPr/>
             </a:pPr>
             <a:endParaRPr lang="en-US" sz="1600" dirty="0">
@@ -21321,7 +21330,7 @@
         </p:nvSpPr>
         <p:spPr>
           <a:xfrm>
-            <a:off x="4977301" y="2083119"/>
+            <a:off x="5436882" y="2427606"/>
             <a:ext cx="4041900" cy="360000"/>
           </a:xfrm>
           <a:prstGeom prst="rect">
@@ -21496,7 +21505,7 @@
         </p:nvSpPr>
         <p:spPr>
           <a:xfrm>
-            <a:off x="-16974" y="2095329"/>
+            <a:off x="442607" y="2439816"/>
             <a:ext cx="4041900" cy="360000"/>
           </a:xfrm>
           <a:prstGeom prst="rect">
@@ -21714,7 +21723,7 @@
         </p:nvSpPr>
         <p:spPr>
           <a:xfrm>
-            <a:off x="4977301" y="2573237"/>
+            <a:off x="5436882" y="2917723"/>
             <a:ext cx="4626282" cy="584775"/>
           </a:xfrm>
           <a:prstGeom prst="rect">
@@ -21782,7 +21791,7 @@
         </p:nvSpPr>
         <p:spPr>
           <a:xfrm>
-            <a:off x="-75406" y="268946"/>
+            <a:off x="384175" y="613433"/>
             <a:ext cx="9561860" cy="360000"/>
           </a:xfrm>
         </p:spPr>
@@ -21816,7 +21825,7 @@
         </p:nvSpPr>
         <p:spPr>
           <a:xfrm>
-            <a:off x="-75406" y="915029"/>
+            <a:off x="384175" y="1259516"/>
             <a:ext cx="8848800" cy="628278"/>
           </a:xfrm>
           <a:prstGeom prst="rect">
@@ -22027,7 +22036,7 @@
         </p:nvSpPr>
         <p:spPr>
           <a:xfrm>
-            <a:off x="-262781" y="2095329"/>
+            <a:off x="196800" y="2439816"/>
             <a:ext cx="4041900" cy="360000"/>
           </a:xfrm>
           <a:prstGeom prst="rect">
@@ -22247,7 +22256,7 @@
         </p:nvSpPr>
         <p:spPr>
           <a:xfrm>
-            <a:off x="4731494" y="2083119"/>
+            <a:off x="5191075" y="2427606"/>
             <a:ext cx="4041900" cy="360000"/>
           </a:xfrm>
           <a:prstGeom prst="rect">
@@ -22422,7 +22431,7 @@
         </p:nvSpPr>
         <p:spPr>
           <a:xfrm>
-            <a:off x="-262781" y="2443119"/>
+            <a:off x="196800" y="2787606"/>
             <a:ext cx="4114800" cy="2962200"/>
           </a:xfrm>
           <a:prstGeom prst="rect">
@@ -22784,7 +22793,7 @@
         </p:nvSpPr>
         <p:spPr>
           <a:xfrm>
-            <a:off x="4731494" y="2443119"/>
+            <a:off x="5191075" y="2787606"/>
             <a:ext cx="4264010" cy="2962200"/>
           </a:xfrm>
           <a:prstGeom prst="rect">
@@ -23162,7 +23171,7 @@
         </p:nvSpPr>
         <p:spPr>
           <a:xfrm>
-            <a:off x="-100694" y="918087"/>
+            <a:off x="358887" y="1262574"/>
             <a:ext cx="9571694" cy="5548698"/>
           </a:xfrm>
           <a:prstGeom prst="rect">
@@ -23440,7 +23449,7 @@
         </p:nvSpPr>
         <p:spPr bwMode="auto">
           <a:xfrm>
-            <a:off x="-100693" y="6369"/>
+            <a:off x="358888" y="350856"/>
             <a:ext cx="7544818" cy="360000"/>
           </a:xfrm>
           <a:prstGeom prst="rect">
@@ -23654,7 +23663,7 @@
         </p:nvSpPr>
         <p:spPr>
           <a:xfrm>
-            <a:off x="-100694" y="2455329"/>
+            <a:off x="358887" y="2799816"/>
             <a:ext cx="4041900" cy="360000"/>
           </a:xfrm>
           <a:prstGeom prst="rect">
@@ -23874,7 +23883,7 @@
         </p:nvSpPr>
         <p:spPr>
           <a:xfrm>
-            <a:off x="-100693" y="4737829"/>
+            <a:off x="358888" y="5082316"/>
             <a:ext cx="4041900" cy="360000"/>
           </a:xfrm>
           <a:prstGeom prst="rect">
@@ -24079,7 +24088,7 @@
         </p:nvSpPr>
         <p:spPr bwMode="auto">
           <a:xfrm>
-            <a:off x="-100693" y="6369"/>
+            <a:off x="358888" y="350856"/>
             <a:ext cx="7544818" cy="360000"/>
           </a:xfrm>
           <a:prstGeom prst="rect">
@@ -24291,7 +24300,7 @@
         </p:nvSpPr>
         <p:spPr>
           <a:xfrm>
-            <a:off x="-100692" y="1305294"/>
+            <a:off x="358889" y="1649780"/>
             <a:ext cx="4434176" cy="2912517"/>
           </a:xfrm>
           <a:prstGeom prst="rect">
@@ -24472,7 +24481,7 @@
         </p:nvSpPr>
         <p:spPr>
           <a:xfrm>
-            <a:off x="5067325" y="1305294"/>
+            <a:off x="5526905" y="1649780"/>
             <a:ext cx="3928593" cy="2912517"/>
           </a:xfrm>
           <a:prstGeom prst="rect">
@@ -24592,7 +24601,7 @@
         </p:nvSpPr>
         <p:spPr>
           <a:xfrm>
-            <a:off x="5067325" y="1037119"/>
+            <a:off x="5526905" y="1381605"/>
             <a:ext cx="2218111" cy="307777"/>
           </a:xfrm>
           <a:prstGeom prst="rect">
@@ -24630,7 +24639,7 @@
         </p:nvSpPr>
         <p:spPr>
           <a:xfrm>
-            <a:off x="-100693" y="997517"/>
+            <a:off x="358888" y="1342003"/>
             <a:ext cx="2144159" cy="307777"/>
           </a:xfrm>
           <a:prstGeom prst="rect">
@@ -24668,7 +24677,7 @@
         </p:nvSpPr>
         <p:spPr>
           <a:xfrm>
-            <a:off x="5067325" y="5102422"/>
+            <a:off x="5526905" y="5446908"/>
             <a:ext cx="3928593" cy="1436213"/>
           </a:xfrm>
           <a:prstGeom prst="rect">
@@ -24792,7 +24801,7 @@
         </p:nvSpPr>
         <p:spPr>
           <a:xfrm>
-            <a:off x="-142651" y="5136292"/>
+            <a:off x="316930" y="5480779"/>
             <a:ext cx="4476135" cy="1402342"/>
           </a:xfrm>
           <a:prstGeom prst="rect">
@@ -24883,7 +24892,7 @@
         </p:nvSpPr>
         <p:spPr>
           <a:xfrm>
-            <a:off x="-142651" y="4771387"/>
+            <a:off x="316930" y="5115873"/>
             <a:ext cx="2144159" cy="307777"/>
           </a:xfrm>
           <a:prstGeom prst="rect">
@@ -25005,7 +25014,7 @@
         </p:nvSpPr>
         <p:spPr>
           <a:xfrm>
-            <a:off x="-100693" y="24657"/>
+            <a:off x="358888" y="369144"/>
             <a:ext cx="7544818" cy="360000"/>
           </a:xfrm>
         </p:spPr>
@@ -25036,7 +25045,7 @@
         </p:blipFill>
         <p:spPr>
           <a:xfrm>
-            <a:off x="-100693" y="700182"/>
+            <a:off x="358888" y="1044668"/>
             <a:ext cx="8629436" cy="6481525"/>
           </a:xfrm>
           <a:prstGeom prst="rect">
@@ -28191,9 +28200,12 @@
 </file>
 
 <file path=customXml/item1.xml><?xml version="1.0" encoding="utf-8"?>
-<p:properties xmlns:p="http://schemas.microsoft.com/office/2006/metadata/properties" xmlns:xsi="http://www.w3.org/2001/XMLSchema-instance" xmlns:pc="http://schemas.microsoft.com/office/infopath/2007/PartnerControls">
-  <documentManagement/>
-</p:properties>
+<?mso-contentType ?>
+<FormTemplates xmlns="http://schemas.microsoft.com/sharepoint/v3/contenttype/forms">
+  <Display>DocumentLibraryForm</Display>
+  <Edit>DocumentLibraryForm</Edit>
+  <New>DocumentLibraryForm</New>
+</FormTemplates>
 </file>
 
 <file path=customXml/item2.xml><?xml version="1.0" encoding="utf-8"?>
@@ -28337,26 +28349,15 @@
 </file>
 
 <file path=customXml/item3.xml><?xml version="1.0" encoding="utf-8"?>
-<?mso-contentType ?>
-<FormTemplates xmlns="http://schemas.microsoft.com/sharepoint/v3/contenttype/forms">
-  <Display>DocumentLibraryForm</Display>
-  <Edit>DocumentLibraryForm</Edit>
-  <New>DocumentLibraryForm</New>
-</FormTemplates>
+<p:properties xmlns:p="http://schemas.microsoft.com/office/2006/metadata/properties" xmlns:xsi="http://www.w3.org/2001/XMLSchema-instance" xmlns:pc="http://schemas.microsoft.com/office/infopath/2007/PartnerControls">
+  <documentManagement/>
+</p:properties>
 </file>
 
 <file path=customXml/itemProps1.xml><?xml version="1.0" encoding="utf-8"?>
-<ds:datastoreItem xmlns:ds="http://schemas.openxmlformats.org/officeDocument/2006/customXml" ds:itemID="{850BC57F-044F-42A8-8B3E-39324752A9D3}">
+<ds:datastoreItem xmlns:ds="http://schemas.openxmlformats.org/officeDocument/2006/customXml" ds:itemID="{CC68CFC3-E560-4D49-A5DA-9FBBF465B335}">
   <ds:schemaRefs>
-    <ds:schemaRef ds:uri="2dcd01a3-bee0-4c28-83ea-b751e1bea8c6"/>
-    <ds:schemaRef ds:uri="http://purl.org/dc/terms/"/>
-    <ds:schemaRef ds:uri="http://schemas.openxmlformats.org/package/2006/metadata/core-properties"/>
-    <ds:schemaRef ds:uri="http://schemas.microsoft.com/office/2006/documentManagement/types"/>
-    <ds:schemaRef ds:uri="http://schemas.microsoft.com/office/infopath/2007/PartnerControls"/>
-    <ds:schemaRef ds:uri="http://purl.org/dc/elements/1.1/"/>
-    <ds:schemaRef ds:uri="http://schemas.microsoft.com/office/2006/metadata/properties"/>
-    <ds:schemaRef ds:uri="http://www.w3.org/XML/1998/namespace"/>
-    <ds:schemaRef ds:uri="http://purl.org/dc/dcmitype/"/>
+    <ds:schemaRef ds:uri="http://schemas.microsoft.com/sharepoint/v3/contenttype/forms"/>
   </ds:schemaRefs>
 </ds:datastoreItem>
 </file>
@@ -28380,9 +28381,17 @@
 </file>
 
 <file path=customXml/itemProps3.xml><?xml version="1.0" encoding="utf-8"?>
-<ds:datastoreItem xmlns:ds="http://schemas.openxmlformats.org/officeDocument/2006/customXml" ds:itemID="{CC68CFC3-E560-4D49-A5DA-9FBBF465B335}">
+<ds:datastoreItem xmlns:ds="http://schemas.openxmlformats.org/officeDocument/2006/customXml" ds:itemID="{850BC57F-044F-42A8-8B3E-39324752A9D3}">
   <ds:schemaRefs>
-    <ds:schemaRef ds:uri="http://schemas.microsoft.com/sharepoint/v3/contenttype/forms"/>
+    <ds:schemaRef ds:uri="2dcd01a3-bee0-4c28-83ea-b751e1bea8c6"/>
+    <ds:schemaRef ds:uri="http://purl.org/dc/terms/"/>
+    <ds:schemaRef ds:uri="http://schemas.openxmlformats.org/package/2006/metadata/core-properties"/>
+    <ds:schemaRef ds:uri="http://schemas.microsoft.com/office/2006/documentManagement/types"/>
+    <ds:schemaRef ds:uri="http://schemas.microsoft.com/office/infopath/2007/PartnerControls"/>
+    <ds:schemaRef ds:uri="http://purl.org/dc/elements/1.1/"/>
+    <ds:schemaRef ds:uri="http://schemas.microsoft.com/office/2006/metadata/properties"/>
+    <ds:schemaRef ds:uri="http://www.w3.org/XML/1998/namespace"/>
+    <ds:schemaRef ds:uri="http://purl.org/dc/dcmitype/"/>
   </ds:schemaRefs>
 </ds:datastoreItem>
 </file>
</xml_diff>